<commit_message>
worked on my parts: requirements and scope
</commit_message>
<xml_diff>
--- a/Unveiled_MidtermPresentation.pptx
+++ b/Unveiled_MidtermPresentation.pptx
@@ -11,14 +11,15 @@
     <p:sldId id="258" r:id="rId5"/>
     <p:sldId id="260" r:id="rId6"/>
     <p:sldId id="265" r:id="rId7"/>
-    <p:sldId id="266" r:id="rId8"/>
-    <p:sldId id="261" r:id="rId9"/>
-    <p:sldId id="268" r:id="rId10"/>
-    <p:sldId id="269" r:id="rId11"/>
-    <p:sldId id="270" r:id="rId12"/>
-    <p:sldId id="262" r:id="rId13"/>
-    <p:sldId id="263" r:id="rId14"/>
-    <p:sldId id="264" r:id="rId15"/>
+    <p:sldId id="271" r:id="rId8"/>
+    <p:sldId id="266" r:id="rId9"/>
+    <p:sldId id="261" r:id="rId10"/>
+    <p:sldId id="268" r:id="rId11"/>
+    <p:sldId id="269" r:id="rId12"/>
+    <p:sldId id="270" r:id="rId13"/>
+    <p:sldId id="262" r:id="rId14"/>
+    <p:sldId id="263" r:id="rId15"/>
+    <p:sldId id="264" r:id="rId16"/>
   </p:sldIdLst>
   <p:sldSz cx="9144000" cy="6858000" type="screen4x3"/>
   <p:notesSz cx="6858000" cy="9144000"/>
@@ -8628,50 +8629,6 @@
         </dgm:presLayoutVars>
       </dgm:prSet>
       <dgm:spPr/>
-    </dgm:pt>
-    <dgm:pt modelId="{4AB9A1D7-027D-4EA5-B85D-2A0F7127070F}" type="pres">
-      <dgm:prSet presAssocID="{C092B36E-43EF-43DF-B7ED-BB22C399B9C8}" presName="arrow" presStyleLbl="bgShp" presStyleIdx="0" presStyleCnt="1" custScaleX="91490"/>
-      <dgm:spPr/>
-    </dgm:pt>
-    <dgm:pt modelId="{3EBEE75B-F854-49BE-8D44-C587FA288C70}" type="pres">
-      <dgm:prSet presAssocID="{C092B36E-43EF-43DF-B7ED-BB22C399B9C8}" presName="points" presStyleCnt="0"/>
-      <dgm:spPr/>
-    </dgm:pt>
-    <dgm:pt modelId="{266DB7BC-080A-4953-A2FB-855B1140DE5A}" type="pres">
-      <dgm:prSet presAssocID="{836F97C4-3741-4FD9-B961-3F6BCC913225}" presName="compositeA" presStyleCnt="0"/>
-      <dgm:spPr/>
-    </dgm:pt>
-    <dgm:pt modelId="{AFCA00F9-252C-4474-BE2C-CDC264E45F31}" type="pres">
-      <dgm:prSet presAssocID="{836F97C4-3741-4FD9-B961-3F6BCC913225}" presName="textA" presStyleLbl="revTx" presStyleIdx="0" presStyleCnt="5">
-        <dgm:presLayoutVars>
-          <dgm:bulletEnabled val="1"/>
-        </dgm:presLayoutVars>
-      </dgm:prSet>
-      <dgm:spPr/>
-    </dgm:pt>
-    <dgm:pt modelId="{C39E104A-B3E2-4B8C-A982-8C8DED6454EC}" type="pres">
-      <dgm:prSet presAssocID="{836F97C4-3741-4FD9-B961-3F6BCC913225}" presName="circleA" presStyleLbl="node1" presStyleIdx="0" presStyleCnt="5"/>
-      <dgm:spPr/>
-    </dgm:pt>
-    <dgm:pt modelId="{C791E6BA-5654-40CE-921D-1829DAC31EAA}" type="pres">
-      <dgm:prSet presAssocID="{836F97C4-3741-4FD9-B961-3F6BCC913225}" presName="spaceA" presStyleCnt="0"/>
-      <dgm:spPr/>
-    </dgm:pt>
-    <dgm:pt modelId="{47ABDAB3-8F7A-485E-B11A-A1136BE795C9}" type="pres">
-      <dgm:prSet presAssocID="{2999D138-02E1-4A62-85C1-A1728A2A3B07}" presName="space" presStyleCnt="0"/>
-      <dgm:spPr/>
-    </dgm:pt>
-    <dgm:pt modelId="{1F77D1AA-3944-4C50-B87C-0EA0B2159593}" type="pres">
-      <dgm:prSet presAssocID="{71E82913-291C-4747-9E0D-E26FBCCAC453}" presName="compositeB" presStyleCnt="0"/>
-      <dgm:spPr/>
-    </dgm:pt>
-    <dgm:pt modelId="{5807F4F2-0443-4295-97A8-373A86B2C4AF}" type="pres">
-      <dgm:prSet presAssocID="{71E82913-291C-4747-9E0D-E26FBCCAC453}" presName="textB" presStyleLbl="revTx" presStyleIdx="1" presStyleCnt="5" custLinFactY="-50000" custLinFactNeighborX="-1324" custLinFactNeighborY="-100000">
-        <dgm:presLayoutVars>
-          <dgm:bulletEnabled val="1"/>
-        </dgm:presLayoutVars>
-      </dgm:prSet>
-      <dgm:spPr/>
       <dgm:t>
         <a:bodyPr/>
         <a:lstStyle/>
@@ -8680,6 +8637,64 @@
         </a:p>
       </dgm:t>
     </dgm:pt>
+    <dgm:pt modelId="{4AB9A1D7-027D-4EA5-B85D-2A0F7127070F}" type="pres">
+      <dgm:prSet presAssocID="{C092B36E-43EF-43DF-B7ED-BB22C399B9C8}" presName="arrow" presStyleLbl="bgShp" presStyleIdx="0" presStyleCnt="1" custScaleX="91490"/>
+      <dgm:spPr/>
+    </dgm:pt>
+    <dgm:pt modelId="{3EBEE75B-F854-49BE-8D44-C587FA288C70}" type="pres">
+      <dgm:prSet presAssocID="{C092B36E-43EF-43DF-B7ED-BB22C399B9C8}" presName="points" presStyleCnt="0"/>
+      <dgm:spPr/>
+    </dgm:pt>
+    <dgm:pt modelId="{266DB7BC-080A-4953-A2FB-855B1140DE5A}" type="pres">
+      <dgm:prSet presAssocID="{836F97C4-3741-4FD9-B961-3F6BCC913225}" presName="compositeA" presStyleCnt="0"/>
+      <dgm:spPr/>
+    </dgm:pt>
+    <dgm:pt modelId="{AFCA00F9-252C-4474-BE2C-CDC264E45F31}" type="pres">
+      <dgm:prSet presAssocID="{836F97C4-3741-4FD9-B961-3F6BCC913225}" presName="textA" presStyleLbl="revTx" presStyleIdx="0" presStyleCnt="5">
+        <dgm:presLayoutVars>
+          <dgm:bulletEnabled val="1"/>
+        </dgm:presLayoutVars>
+      </dgm:prSet>
+      <dgm:spPr/>
+      <dgm:t>
+        <a:bodyPr/>
+        <a:lstStyle/>
+        <a:p>
+          <a:endParaRPr lang="de-DE"/>
+        </a:p>
+      </dgm:t>
+    </dgm:pt>
+    <dgm:pt modelId="{C39E104A-B3E2-4B8C-A982-8C8DED6454EC}" type="pres">
+      <dgm:prSet presAssocID="{836F97C4-3741-4FD9-B961-3F6BCC913225}" presName="circleA" presStyleLbl="node1" presStyleIdx="0" presStyleCnt="5"/>
+      <dgm:spPr/>
+    </dgm:pt>
+    <dgm:pt modelId="{C791E6BA-5654-40CE-921D-1829DAC31EAA}" type="pres">
+      <dgm:prSet presAssocID="{836F97C4-3741-4FD9-B961-3F6BCC913225}" presName="spaceA" presStyleCnt="0"/>
+      <dgm:spPr/>
+    </dgm:pt>
+    <dgm:pt modelId="{47ABDAB3-8F7A-485E-B11A-A1136BE795C9}" type="pres">
+      <dgm:prSet presAssocID="{2999D138-02E1-4A62-85C1-A1728A2A3B07}" presName="space" presStyleCnt="0"/>
+      <dgm:spPr/>
+    </dgm:pt>
+    <dgm:pt modelId="{1F77D1AA-3944-4C50-B87C-0EA0B2159593}" type="pres">
+      <dgm:prSet presAssocID="{71E82913-291C-4747-9E0D-E26FBCCAC453}" presName="compositeB" presStyleCnt="0"/>
+      <dgm:spPr/>
+    </dgm:pt>
+    <dgm:pt modelId="{5807F4F2-0443-4295-97A8-373A86B2C4AF}" type="pres">
+      <dgm:prSet presAssocID="{71E82913-291C-4747-9E0D-E26FBCCAC453}" presName="textB" presStyleLbl="revTx" presStyleIdx="1" presStyleCnt="5" custLinFactY="-50000" custLinFactNeighborX="-1324" custLinFactNeighborY="-100000">
+        <dgm:presLayoutVars>
+          <dgm:bulletEnabled val="1"/>
+        </dgm:presLayoutVars>
+      </dgm:prSet>
+      <dgm:spPr/>
+      <dgm:t>
+        <a:bodyPr/>
+        <a:lstStyle/>
+        <a:p>
+          <a:endParaRPr lang="de-DE"/>
+        </a:p>
+      </dgm:t>
+    </dgm:pt>
     <dgm:pt modelId="{3390B0D5-AE1A-4F2A-BB66-6CE85BAE12B8}" type="pres">
       <dgm:prSet presAssocID="{71E82913-291C-4747-9E0D-E26FBCCAC453}" presName="circleB" presStyleLbl="node1" presStyleIdx="1" presStyleCnt="5"/>
       <dgm:spPr/>
@@ -8703,6 +8718,13 @@
         </dgm:presLayoutVars>
       </dgm:prSet>
       <dgm:spPr/>
+      <dgm:t>
+        <a:bodyPr/>
+        <a:lstStyle/>
+        <a:p>
+          <a:endParaRPr lang="de-DE"/>
+        </a:p>
+      </dgm:t>
     </dgm:pt>
     <dgm:pt modelId="{6127A24A-86B8-4753-A36D-94B3824E5DCE}" type="pres">
       <dgm:prSet presAssocID="{E358C221-9508-4421-8C3E-C14A1766DA97}" presName="circleA" presStyleLbl="node1" presStyleIdx="2" presStyleCnt="5"/>
@@ -8727,6 +8749,13 @@
         </dgm:presLayoutVars>
       </dgm:prSet>
       <dgm:spPr/>
+      <dgm:t>
+        <a:bodyPr/>
+        <a:lstStyle/>
+        <a:p>
+          <a:endParaRPr lang="de-DE"/>
+        </a:p>
+      </dgm:t>
     </dgm:pt>
     <dgm:pt modelId="{EE50FC0A-1800-4B55-A6F5-CD88882CD84D}" type="pres">
       <dgm:prSet presAssocID="{263D1932-C914-44FA-91E5-7404EFB65698}" presName="circleB" presStyleLbl="node1" presStyleIdx="3" presStyleCnt="5"/>
@@ -8751,6 +8780,13 @@
         </dgm:presLayoutVars>
       </dgm:prSet>
       <dgm:spPr/>
+      <dgm:t>
+        <a:bodyPr/>
+        <a:lstStyle/>
+        <a:p>
+          <a:endParaRPr lang="de-DE"/>
+        </a:p>
+      </dgm:t>
     </dgm:pt>
     <dgm:pt modelId="{56D082C5-8BA8-46CA-814D-30BD0AEEB51B}" type="pres">
       <dgm:prSet presAssocID="{863FD00F-879C-40D8-BCA7-9630CC06DBCD}" presName="circleA" presStyleLbl="node1" presStyleIdx="4" presStyleCnt="5"/>
@@ -8768,8 +8804,8 @@
     <dgm:cxn modelId="{D3D4CC29-94CB-4FEC-B7A2-95AABE289EDC}" srcId="{C092B36E-43EF-43DF-B7ED-BB22C399B9C8}" destId="{263D1932-C914-44FA-91E5-7404EFB65698}" srcOrd="3" destOrd="0" parTransId="{609100EC-FE04-4491-9FC7-FB2D7B8A9EA8}" sibTransId="{B2FFFAB1-8BB1-4D03-83F8-F71DB4C1EB98}"/>
     <dgm:cxn modelId="{1B26B54B-FB3C-4BF5-99D2-E5582701A759}" type="presOf" srcId="{C092B36E-43EF-43DF-B7ED-BB22C399B9C8}" destId="{1F9F75E3-3329-4491-8611-F9A888AE0E3A}" srcOrd="0" destOrd="0" presId="urn:microsoft.com/office/officeart/2005/8/layout/hProcess11"/>
     <dgm:cxn modelId="{6D45D7F7-5B5E-42FE-9AF2-A5A8DD13A56E}" type="presOf" srcId="{836F97C4-3741-4FD9-B961-3F6BCC913225}" destId="{AFCA00F9-252C-4474-BE2C-CDC264E45F31}" srcOrd="0" destOrd="0" presId="urn:microsoft.com/office/officeart/2005/8/layout/hProcess11"/>
+    <dgm:cxn modelId="{5FABF176-CC11-489A-93C9-236F4B37BCE8}" type="presOf" srcId="{863FD00F-879C-40D8-BCA7-9630CC06DBCD}" destId="{12962CA2-D647-49BD-81FC-E786EBED1DED}" srcOrd="0" destOrd="0" presId="urn:microsoft.com/office/officeart/2005/8/layout/hProcess11"/>
     <dgm:cxn modelId="{29D2F2BC-0B56-478C-9003-9B899795939A}" type="presOf" srcId="{71E82913-291C-4747-9E0D-E26FBCCAC453}" destId="{5807F4F2-0443-4295-97A8-373A86B2C4AF}" srcOrd="0" destOrd="0" presId="urn:microsoft.com/office/officeart/2005/8/layout/hProcess11"/>
-    <dgm:cxn modelId="{5FABF176-CC11-489A-93C9-236F4B37BCE8}" type="presOf" srcId="{863FD00F-879C-40D8-BCA7-9630CC06DBCD}" destId="{12962CA2-D647-49BD-81FC-E786EBED1DED}" srcOrd="0" destOrd="0" presId="urn:microsoft.com/office/officeart/2005/8/layout/hProcess11"/>
     <dgm:cxn modelId="{8DBD94C4-BA2B-4633-9A5B-3DA2EE276692}" type="presOf" srcId="{263D1932-C914-44FA-91E5-7404EFB65698}" destId="{42CB6A0C-9D4D-4270-88D8-F3F1DA46DAD1}" srcOrd="0" destOrd="0" presId="urn:microsoft.com/office/officeart/2005/8/layout/hProcess11"/>
     <dgm:cxn modelId="{A4D45F1E-77BC-4DF4-88BA-43780E9D9E21}" srcId="{C092B36E-43EF-43DF-B7ED-BB22C399B9C8}" destId="{836F97C4-3741-4FD9-B961-3F6BCC913225}" srcOrd="0" destOrd="0" parTransId="{A9D208C0-0805-49DE-B527-ED47A66A62E8}" sibTransId="{2999D138-02E1-4A62-85C1-A1728A2A3B07}"/>
     <dgm:cxn modelId="{B46074B0-180B-4AC5-B3AE-BD285482D9DE}" srcId="{C092B36E-43EF-43DF-B7ED-BB22C399B9C8}" destId="{E358C221-9508-4421-8C3E-C14A1766DA97}" srcOrd="2" destOrd="0" parTransId="{94F7D42F-D15B-404F-9D18-207381EC79A2}" sibTransId="{CD746562-A3E3-40F1-A1C0-E862C98D93BC}"/>
@@ -9101,50 +9137,6 @@
         </dgm:presLayoutVars>
       </dgm:prSet>
       <dgm:spPr/>
-    </dgm:pt>
-    <dgm:pt modelId="{4AB9A1D7-027D-4EA5-B85D-2A0F7127070F}" type="pres">
-      <dgm:prSet presAssocID="{C092B36E-43EF-43DF-B7ED-BB22C399B9C8}" presName="arrow" presStyleLbl="bgShp" presStyleIdx="0" presStyleCnt="1" custScaleX="91490"/>
-      <dgm:spPr/>
-    </dgm:pt>
-    <dgm:pt modelId="{3EBEE75B-F854-49BE-8D44-C587FA288C70}" type="pres">
-      <dgm:prSet presAssocID="{C092B36E-43EF-43DF-B7ED-BB22C399B9C8}" presName="points" presStyleCnt="0"/>
-      <dgm:spPr/>
-    </dgm:pt>
-    <dgm:pt modelId="{266DB7BC-080A-4953-A2FB-855B1140DE5A}" type="pres">
-      <dgm:prSet presAssocID="{836F97C4-3741-4FD9-B961-3F6BCC913225}" presName="compositeA" presStyleCnt="0"/>
-      <dgm:spPr/>
-    </dgm:pt>
-    <dgm:pt modelId="{AFCA00F9-252C-4474-BE2C-CDC264E45F31}" type="pres">
-      <dgm:prSet presAssocID="{836F97C4-3741-4FD9-B961-3F6BCC913225}" presName="textA" presStyleLbl="revTx" presStyleIdx="0" presStyleCnt="5">
-        <dgm:presLayoutVars>
-          <dgm:bulletEnabled val="1"/>
-        </dgm:presLayoutVars>
-      </dgm:prSet>
-      <dgm:spPr/>
-    </dgm:pt>
-    <dgm:pt modelId="{C39E104A-B3E2-4B8C-A982-8C8DED6454EC}" type="pres">
-      <dgm:prSet presAssocID="{836F97C4-3741-4FD9-B961-3F6BCC913225}" presName="circleA" presStyleLbl="node1" presStyleIdx="0" presStyleCnt="5"/>
-      <dgm:spPr/>
-    </dgm:pt>
-    <dgm:pt modelId="{C791E6BA-5654-40CE-921D-1829DAC31EAA}" type="pres">
-      <dgm:prSet presAssocID="{836F97C4-3741-4FD9-B961-3F6BCC913225}" presName="spaceA" presStyleCnt="0"/>
-      <dgm:spPr/>
-    </dgm:pt>
-    <dgm:pt modelId="{47ABDAB3-8F7A-485E-B11A-A1136BE795C9}" type="pres">
-      <dgm:prSet presAssocID="{2999D138-02E1-4A62-85C1-A1728A2A3B07}" presName="space" presStyleCnt="0"/>
-      <dgm:spPr/>
-    </dgm:pt>
-    <dgm:pt modelId="{1F77D1AA-3944-4C50-B87C-0EA0B2159593}" type="pres">
-      <dgm:prSet presAssocID="{71E82913-291C-4747-9E0D-E26FBCCAC453}" presName="compositeB" presStyleCnt="0"/>
-      <dgm:spPr/>
-    </dgm:pt>
-    <dgm:pt modelId="{5807F4F2-0443-4295-97A8-373A86B2C4AF}" type="pres">
-      <dgm:prSet presAssocID="{71E82913-291C-4747-9E0D-E26FBCCAC453}" presName="textB" presStyleLbl="revTx" presStyleIdx="1" presStyleCnt="5" custLinFactY="-50000" custLinFactNeighborX="-1324" custLinFactNeighborY="-100000">
-        <dgm:presLayoutVars>
-          <dgm:bulletEnabled val="1"/>
-        </dgm:presLayoutVars>
-      </dgm:prSet>
-      <dgm:spPr/>
       <dgm:t>
         <a:bodyPr/>
         <a:lstStyle/>
@@ -9153,6 +9145,64 @@
         </a:p>
       </dgm:t>
     </dgm:pt>
+    <dgm:pt modelId="{4AB9A1D7-027D-4EA5-B85D-2A0F7127070F}" type="pres">
+      <dgm:prSet presAssocID="{C092B36E-43EF-43DF-B7ED-BB22C399B9C8}" presName="arrow" presStyleLbl="bgShp" presStyleIdx="0" presStyleCnt="1" custScaleX="91490"/>
+      <dgm:spPr/>
+    </dgm:pt>
+    <dgm:pt modelId="{3EBEE75B-F854-49BE-8D44-C587FA288C70}" type="pres">
+      <dgm:prSet presAssocID="{C092B36E-43EF-43DF-B7ED-BB22C399B9C8}" presName="points" presStyleCnt="0"/>
+      <dgm:spPr/>
+    </dgm:pt>
+    <dgm:pt modelId="{266DB7BC-080A-4953-A2FB-855B1140DE5A}" type="pres">
+      <dgm:prSet presAssocID="{836F97C4-3741-4FD9-B961-3F6BCC913225}" presName="compositeA" presStyleCnt="0"/>
+      <dgm:spPr/>
+    </dgm:pt>
+    <dgm:pt modelId="{AFCA00F9-252C-4474-BE2C-CDC264E45F31}" type="pres">
+      <dgm:prSet presAssocID="{836F97C4-3741-4FD9-B961-3F6BCC913225}" presName="textA" presStyleLbl="revTx" presStyleIdx="0" presStyleCnt="5">
+        <dgm:presLayoutVars>
+          <dgm:bulletEnabled val="1"/>
+        </dgm:presLayoutVars>
+      </dgm:prSet>
+      <dgm:spPr/>
+      <dgm:t>
+        <a:bodyPr/>
+        <a:lstStyle/>
+        <a:p>
+          <a:endParaRPr lang="de-DE"/>
+        </a:p>
+      </dgm:t>
+    </dgm:pt>
+    <dgm:pt modelId="{C39E104A-B3E2-4B8C-A982-8C8DED6454EC}" type="pres">
+      <dgm:prSet presAssocID="{836F97C4-3741-4FD9-B961-3F6BCC913225}" presName="circleA" presStyleLbl="node1" presStyleIdx="0" presStyleCnt="5"/>
+      <dgm:spPr/>
+    </dgm:pt>
+    <dgm:pt modelId="{C791E6BA-5654-40CE-921D-1829DAC31EAA}" type="pres">
+      <dgm:prSet presAssocID="{836F97C4-3741-4FD9-B961-3F6BCC913225}" presName="spaceA" presStyleCnt="0"/>
+      <dgm:spPr/>
+    </dgm:pt>
+    <dgm:pt modelId="{47ABDAB3-8F7A-485E-B11A-A1136BE795C9}" type="pres">
+      <dgm:prSet presAssocID="{2999D138-02E1-4A62-85C1-A1728A2A3B07}" presName="space" presStyleCnt="0"/>
+      <dgm:spPr/>
+    </dgm:pt>
+    <dgm:pt modelId="{1F77D1AA-3944-4C50-B87C-0EA0B2159593}" type="pres">
+      <dgm:prSet presAssocID="{71E82913-291C-4747-9E0D-E26FBCCAC453}" presName="compositeB" presStyleCnt="0"/>
+      <dgm:spPr/>
+    </dgm:pt>
+    <dgm:pt modelId="{5807F4F2-0443-4295-97A8-373A86B2C4AF}" type="pres">
+      <dgm:prSet presAssocID="{71E82913-291C-4747-9E0D-E26FBCCAC453}" presName="textB" presStyleLbl="revTx" presStyleIdx="1" presStyleCnt="5" custLinFactY="-50000" custLinFactNeighborX="-1324" custLinFactNeighborY="-100000">
+        <dgm:presLayoutVars>
+          <dgm:bulletEnabled val="1"/>
+        </dgm:presLayoutVars>
+      </dgm:prSet>
+      <dgm:spPr/>
+      <dgm:t>
+        <a:bodyPr/>
+        <a:lstStyle/>
+        <a:p>
+          <a:endParaRPr lang="de-DE"/>
+        </a:p>
+      </dgm:t>
+    </dgm:pt>
     <dgm:pt modelId="{3390B0D5-AE1A-4F2A-BB66-6CE85BAE12B8}" type="pres">
       <dgm:prSet presAssocID="{71E82913-291C-4747-9E0D-E26FBCCAC453}" presName="circleB" presStyleLbl="node1" presStyleIdx="1" presStyleCnt="5"/>
       <dgm:spPr/>
@@ -9176,6 +9226,13 @@
         </dgm:presLayoutVars>
       </dgm:prSet>
       <dgm:spPr/>
+      <dgm:t>
+        <a:bodyPr/>
+        <a:lstStyle/>
+        <a:p>
+          <a:endParaRPr lang="de-DE"/>
+        </a:p>
+      </dgm:t>
     </dgm:pt>
     <dgm:pt modelId="{6127A24A-86B8-4753-A36D-94B3824E5DCE}" type="pres">
       <dgm:prSet presAssocID="{E358C221-9508-4421-8C3E-C14A1766DA97}" presName="circleA" presStyleLbl="node1" presStyleIdx="2" presStyleCnt="5"/>
@@ -9200,6 +9257,13 @@
         </dgm:presLayoutVars>
       </dgm:prSet>
       <dgm:spPr/>
+      <dgm:t>
+        <a:bodyPr/>
+        <a:lstStyle/>
+        <a:p>
+          <a:endParaRPr lang="de-DE"/>
+        </a:p>
+      </dgm:t>
     </dgm:pt>
     <dgm:pt modelId="{EE50FC0A-1800-4B55-A6F5-CD88882CD84D}" type="pres">
       <dgm:prSet presAssocID="{263D1932-C914-44FA-91E5-7404EFB65698}" presName="circleB" presStyleLbl="node1" presStyleIdx="3" presStyleCnt="5"/>
@@ -9224,6 +9288,13 @@
         </dgm:presLayoutVars>
       </dgm:prSet>
       <dgm:spPr/>
+      <dgm:t>
+        <a:bodyPr/>
+        <a:lstStyle/>
+        <a:p>
+          <a:endParaRPr lang="de-DE"/>
+        </a:p>
+      </dgm:t>
     </dgm:pt>
     <dgm:pt modelId="{56D082C5-8BA8-46CA-814D-30BD0AEEB51B}" type="pres">
       <dgm:prSet presAssocID="{863FD00F-879C-40D8-BCA7-9630CC06DBCD}" presName="circleA" presStyleLbl="node1" presStyleIdx="4" presStyleCnt="5"/>
@@ -9574,50 +9645,6 @@
         </dgm:presLayoutVars>
       </dgm:prSet>
       <dgm:spPr/>
-    </dgm:pt>
-    <dgm:pt modelId="{4AB9A1D7-027D-4EA5-B85D-2A0F7127070F}" type="pres">
-      <dgm:prSet presAssocID="{C092B36E-43EF-43DF-B7ED-BB22C399B9C8}" presName="arrow" presStyleLbl="bgShp" presStyleIdx="0" presStyleCnt="1" custScaleX="91490"/>
-      <dgm:spPr/>
-    </dgm:pt>
-    <dgm:pt modelId="{3EBEE75B-F854-49BE-8D44-C587FA288C70}" type="pres">
-      <dgm:prSet presAssocID="{C092B36E-43EF-43DF-B7ED-BB22C399B9C8}" presName="points" presStyleCnt="0"/>
-      <dgm:spPr/>
-    </dgm:pt>
-    <dgm:pt modelId="{266DB7BC-080A-4953-A2FB-855B1140DE5A}" type="pres">
-      <dgm:prSet presAssocID="{836F97C4-3741-4FD9-B961-3F6BCC913225}" presName="compositeA" presStyleCnt="0"/>
-      <dgm:spPr/>
-    </dgm:pt>
-    <dgm:pt modelId="{AFCA00F9-252C-4474-BE2C-CDC264E45F31}" type="pres">
-      <dgm:prSet presAssocID="{836F97C4-3741-4FD9-B961-3F6BCC913225}" presName="textA" presStyleLbl="revTx" presStyleIdx="0" presStyleCnt="5">
-        <dgm:presLayoutVars>
-          <dgm:bulletEnabled val="1"/>
-        </dgm:presLayoutVars>
-      </dgm:prSet>
-      <dgm:spPr/>
-    </dgm:pt>
-    <dgm:pt modelId="{C39E104A-B3E2-4B8C-A982-8C8DED6454EC}" type="pres">
-      <dgm:prSet presAssocID="{836F97C4-3741-4FD9-B961-3F6BCC913225}" presName="circleA" presStyleLbl="node1" presStyleIdx="0" presStyleCnt="5"/>
-      <dgm:spPr/>
-    </dgm:pt>
-    <dgm:pt modelId="{C791E6BA-5654-40CE-921D-1829DAC31EAA}" type="pres">
-      <dgm:prSet presAssocID="{836F97C4-3741-4FD9-B961-3F6BCC913225}" presName="spaceA" presStyleCnt="0"/>
-      <dgm:spPr/>
-    </dgm:pt>
-    <dgm:pt modelId="{47ABDAB3-8F7A-485E-B11A-A1136BE795C9}" type="pres">
-      <dgm:prSet presAssocID="{2999D138-02E1-4A62-85C1-A1728A2A3B07}" presName="space" presStyleCnt="0"/>
-      <dgm:spPr/>
-    </dgm:pt>
-    <dgm:pt modelId="{1F77D1AA-3944-4C50-B87C-0EA0B2159593}" type="pres">
-      <dgm:prSet presAssocID="{71E82913-291C-4747-9E0D-E26FBCCAC453}" presName="compositeB" presStyleCnt="0"/>
-      <dgm:spPr/>
-    </dgm:pt>
-    <dgm:pt modelId="{5807F4F2-0443-4295-97A8-373A86B2C4AF}" type="pres">
-      <dgm:prSet presAssocID="{71E82913-291C-4747-9E0D-E26FBCCAC453}" presName="textB" presStyleLbl="revTx" presStyleIdx="1" presStyleCnt="5" custLinFactY="-50000" custLinFactNeighborX="-1324" custLinFactNeighborY="-100000">
-        <dgm:presLayoutVars>
-          <dgm:bulletEnabled val="1"/>
-        </dgm:presLayoutVars>
-      </dgm:prSet>
-      <dgm:spPr/>
       <dgm:t>
         <a:bodyPr/>
         <a:lstStyle/>
@@ -9626,6 +9653,64 @@
         </a:p>
       </dgm:t>
     </dgm:pt>
+    <dgm:pt modelId="{4AB9A1D7-027D-4EA5-B85D-2A0F7127070F}" type="pres">
+      <dgm:prSet presAssocID="{C092B36E-43EF-43DF-B7ED-BB22C399B9C8}" presName="arrow" presStyleLbl="bgShp" presStyleIdx="0" presStyleCnt="1" custScaleX="91490"/>
+      <dgm:spPr/>
+    </dgm:pt>
+    <dgm:pt modelId="{3EBEE75B-F854-49BE-8D44-C587FA288C70}" type="pres">
+      <dgm:prSet presAssocID="{C092B36E-43EF-43DF-B7ED-BB22C399B9C8}" presName="points" presStyleCnt="0"/>
+      <dgm:spPr/>
+    </dgm:pt>
+    <dgm:pt modelId="{266DB7BC-080A-4953-A2FB-855B1140DE5A}" type="pres">
+      <dgm:prSet presAssocID="{836F97C4-3741-4FD9-B961-3F6BCC913225}" presName="compositeA" presStyleCnt="0"/>
+      <dgm:spPr/>
+    </dgm:pt>
+    <dgm:pt modelId="{AFCA00F9-252C-4474-BE2C-CDC264E45F31}" type="pres">
+      <dgm:prSet presAssocID="{836F97C4-3741-4FD9-B961-3F6BCC913225}" presName="textA" presStyleLbl="revTx" presStyleIdx="0" presStyleCnt="5">
+        <dgm:presLayoutVars>
+          <dgm:bulletEnabled val="1"/>
+        </dgm:presLayoutVars>
+      </dgm:prSet>
+      <dgm:spPr/>
+      <dgm:t>
+        <a:bodyPr/>
+        <a:lstStyle/>
+        <a:p>
+          <a:endParaRPr lang="de-DE"/>
+        </a:p>
+      </dgm:t>
+    </dgm:pt>
+    <dgm:pt modelId="{C39E104A-B3E2-4B8C-A982-8C8DED6454EC}" type="pres">
+      <dgm:prSet presAssocID="{836F97C4-3741-4FD9-B961-3F6BCC913225}" presName="circleA" presStyleLbl="node1" presStyleIdx="0" presStyleCnt="5"/>
+      <dgm:spPr/>
+    </dgm:pt>
+    <dgm:pt modelId="{C791E6BA-5654-40CE-921D-1829DAC31EAA}" type="pres">
+      <dgm:prSet presAssocID="{836F97C4-3741-4FD9-B961-3F6BCC913225}" presName="spaceA" presStyleCnt="0"/>
+      <dgm:spPr/>
+    </dgm:pt>
+    <dgm:pt modelId="{47ABDAB3-8F7A-485E-B11A-A1136BE795C9}" type="pres">
+      <dgm:prSet presAssocID="{2999D138-02E1-4A62-85C1-A1728A2A3B07}" presName="space" presStyleCnt="0"/>
+      <dgm:spPr/>
+    </dgm:pt>
+    <dgm:pt modelId="{1F77D1AA-3944-4C50-B87C-0EA0B2159593}" type="pres">
+      <dgm:prSet presAssocID="{71E82913-291C-4747-9E0D-E26FBCCAC453}" presName="compositeB" presStyleCnt="0"/>
+      <dgm:spPr/>
+    </dgm:pt>
+    <dgm:pt modelId="{5807F4F2-0443-4295-97A8-373A86B2C4AF}" type="pres">
+      <dgm:prSet presAssocID="{71E82913-291C-4747-9E0D-E26FBCCAC453}" presName="textB" presStyleLbl="revTx" presStyleIdx="1" presStyleCnt="5" custLinFactY="-50000" custLinFactNeighborX="-1324" custLinFactNeighborY="-100000">
+        <dgm:presLayoutVars>
+          <dgm:bulletEnabled val="1"/>
+        </dgm:presLayoutVars>
+      </dgm:prSet>
+      <dgm:spPr/>
+      <dgm:t>
+        <a:bodyPr/>
+        <a:lstStyle/>
+        <a:p>
+          <a:endParaRPr lang="de-DE"/>
+        </a:p>
+      </dgm:t>
+    </dgm:pt>
     <dgm:pt modelId="{3390B0D5-AE1A-4F2A-BB66-6CE85BAE12B8}" type="pres">
       <dgm:prSet presAssocID="{71E82913-291C-4747-9E0D-E26FBCCAC453}" presName="circleB" presStyleLbl="node1" presStyleIdx="1" presStyleCnt="5"/>
       <dgm:spPr/>
@@ -9649,6 +9734,13 @@
         </dgm:presLayoutVars>
       </dgm:prSet>
       <dgm:spPr/>
+      <dgm:t>
+        <a:bodyPr/>
+        <a:lstStyle/>
+        <a:p>
+          <a:endParaRPr lang="de-DE"/>
+        </a:p>
+      </dgm:t>
     </dgm:pt>
     <dgm:pt modelId="{6127A24A-86B8-4753-A36D-94B3824E5DCE}" type="pres">
       <dgm:prSet presAssocID="{E358C221-9508-4421-8C3E-C14A1766DA97}" presName="circleA" presStyleLbl="node1" presStyleIdx="2" presStyleCnt="5"/>
@@ -9673,6 +9765,13 @@
         </dgm:presLayoutVars>
       </dgm:prSet>
       <dgm:spPr/>
+      <dgm:t>
+        <a:bodyPr/>
+        <a:lstStyle/>
+        <a:p>
+          <a:endParaRPr lang="de-DE"/>
+        </a:p>
+      </dgm:t>
     </dgm:pt>
     <dgm:pt modelId="{EE50FC0A-1800-4B55-A6F5-CD88882CD84D}" type="pres">
       <dgm:prSet presAssocID="{263D1932-C914-44FA-91E5-7404EFB65698}" presName="circleB" presStyleLbl="node1" presStyleIdx="3" presStyleCnt="5"/>
@@ -9697,6 +9796,13 @@
         </dgm:presLayoutVars>
       </dgm:prSet>
       <dgm:spPr/>
+      <dgm:t>
+        <a:bodyPr/>
+        <a:lstStyle/>
+        <a:p>
+          <a:endParaRPr lang="de-DE"/>
+        </a:p>
+      </dgm:t>
     </dgm:pt>
     <dgm:pt modelId="{56D082C5-8BA8-46CA-814D-30BD0AEEB51B}" type="pres">
       <dgm:prSet presAssocID="{863FD00F-879C-40D8-BCA7-9630CC06DBCD}" presName="circleA" presStyleLbl="node1" presStyleIdx="4" presStyleCnt="5"/>
@@ -10047,50 +10153,6 @@
         </dgm:presLayoutVars>
       </dgm:prSet>
       <dgm:spPr/>
-    </dgm:pt>
-    <dgm:pt modelId="{4AB9A1D7-027D-4EA5-B85D-2A0F7127070F}" type="pres">
-      <dgm:prSet presAssocID="{C092B36E-43EF-43DF-B7ED-BB22C399B9C8}" presName="arrow" presStyleLbl="bgShp" presStyleIdx="0" presStyleCnt="1" custScaleX="91490"/>
-      <dgm:spPr/>
-    </dgm:pt>
-    <dgm:pt modelId="{3EBEE75B-F854-49BE-8D44-C587FA288C70}" type="pres">
-      <dgm:prSet presAssocID="{C092B36E-43EF-43DF-B7ED-BB22C399B9C8}" presName="points" presStyleCnt="0"/>
-      <dgm:spPr/>
-    </dgm:pt>
-    <dgm:pt modelId="{266DB7BC-080A-4953-A2FB-855B1140DE5A}" type="pres">
-      <dgm:prSet presAssocID="{836F97C4-3741-4FD9-B961-3F6BCC913225}" presName="compositeA" presStyleCnt="0"/>
-      <dgm:spPr/>
-    </dgm:pt>
-    <dgm:pt modelId="{AFCA00F9-252C-4474-BE2C-CDC264E45F31}" type="pres">
-      <dgm:prSet presAssocID="{836F97C4-3741-4FD9-B961-3F6BCC913225}" presName="textA" presStyleLbl="revTx" presStyleIdx="0" presStyleCnt="5">
-        <dgm:presLayoutVars>
-          <dgm:bulletEnabled val="1"/>
-        </dgm:presLayoutVars>
-      </dgm:prSet>
-      <dgm:spPr/>
-    </dgm:pt>
-    <dgm:pt modelId="{C39E104A-B3E2-4B8C-A982-8C8DED6454EC}" type="pres">
-      <dgm:prSet presAssocID="{836F97C4-3741-4FD9-B961-3F6BCC913225}" presName="circleA" presStyleLbl="node1" presStyleIdx="0" presStyleCnt="5"/>
-      <dgm:spPr/>
-    </dgm:pt>
-    <dgm:pt modelId="{C791E6BA-5654-40CE-921D-1829DAC31EAA}" type="pres">
-      <dgm:prSet presAssocID="{836F97C4-3741-4FD9-B961-3F6BCC913225}" presName="spaceA" presStyleCnt="0"/>
-      <dgm:spPr/>
-    </dgm:pt>
-    <dgm:pt modelId="{47ABDAB3-8F7A-485E-B11A-A1136BE795C9}" type="pres">
-      <dgm:prSet presAssocID="{2999D138-02E1-4A62-85C1-A1728A2A3B07}" presName="space" presStyleCnt="0"/>
-      <dgm:spPr/>
-    </dgm:pt>
-    <dgm:pt modelId="{1F77D1AA-3944-4C50-B87C-0EA0B2159593}" type="pres">
-      <dgm:prSet presAssocID="{71E82913-291C-4747-9E0D-E26FBCCAC453}" presName="compositeB" presStyleCnt="0"/>
-      <dgm:spPr/>
-    </dgm:pt>
-    <dgm:pt modelId="{5807F4F2-0443-4295-97A8-373A86B2C4AF}" type="pres">
-      <dgm:prSet presAssocID="{71E82913-291C-4747-9E0D-E26FBCCAC453}" presName="textB" presStyleLbl="revTx" presStyleIdx="1" presStyleCnt="5" custLinFactY="-50000" custLinFactNeighborX="-1324" custLinFactNeighborY="-100000">
-        <dgm:presLayoutVars>
-          <dgm:bulletEnabled val="1"/>
-        </dgm:presLayoutVars>
-      </dgm:prSet>
-      <dgm:spPr/>
       <dgm:t>
         <a:bodyPr/>
         <a:lstStyle/>
@@ -10099,6 +10161,64 @@
         </a:p>
       </dgm:t>
     </dgm:pt>
+    <dgm:pt modelId="{4AB9A1D7-027D-4EA5-B85D-2A0F7127070F}" type="pres">
+      <dgm:prSet presAssocID="{C092B36E-43EF-43DF-B7ED-BB22C399B9C8}" presName="arrow" presStyleLbl="bgShp" presStyleIdx="0" presStyleCnt="1" custScaleX="91490"/>
+      <dgm:spPr/>
+    </dgm:pt>
+    <dgm:pt modelId="{3EBEE75B-F854-49BE-8D44-C587FA288C70}" type="pres">
+      <dgm:prSet presAssocID="{C092B36E-43EF-43DF-B7ED-BB22C399B9C8}" presName="points" presStyleCnt="0"/>
+      <dgm:spPr/>
+    </dgm:pt>
+    <dgm:pt modelId="{266DB7BC-080A-4953-A2FB-855B1140DE5A}" type="pres">
+      <dgm:prSet presAssocID="{836F97C4-3741-4FD9-B961-3F6BCC913225}" presName="compositeA" presStyleCnt="0"/>
+      <dgm:spPr/>
+    </dgm:pt>
+    <dgm:pt modelId="{AFCA00F9-252C-4474-BE2C-CDC264E45F31}" type="pres">
+      <dgm:prSet presAssocID="{836F97C4-3741-4FD9-B961-3F6BCC913225}" presName="textA" presStyleLbl="revTx" presStyleIdx="0" presStyleCnt="5">
+        <dgm:presLayoutVars>
+          <dgm:bulletEnabled val="1"/>
+        </dgm:presLayoutVars>
+      </dgm:prSet>
+      <dgm:spPr/>
+      <dgm:t>
+        <a:bodyPr/>
+        <a:lstStyle/>
+        <a:p>
+          <a:endParaRPr lang="de-DE"/>
+        </a:p>
+      </dgm:t>
+    </dgm:pt>
+    <dgm:pt modelId="{C39E104A-B3E2-4B8C-A982-8C8DED6454EC}" type="pres">
+      <dgm:prSet presAssocID="{836F97C4-3741-4FD9-B961-3F6BCC913225}" presName="circleA" presStyleLbl="node1" presStyleIdx="0" presStyleCnt="5"/>
+      <dgm:spPr/>
+    </dgm:pt>
+    <dgm:pt modelId="{C791E6BA-5654-40CE-921D-1829DAC31EAA}" type="pres">
+      <dgm:prSet presAssocID="{836F97C4-3741-4FD9-B961-3F6BCC913225}" presName="spaceA" presStyleCnt="0"/>
+      <dgm:spPr/>
+    </dgm:pt>
+    <dgm:pt modelId="{47ABDAB3-8F7A-485E-B11A-A1136BE795C9}" type="pres">
+      <dgm:prSet presAssocID="{2999D138-02E1-4A62-85C1-A1728A2A3B07}" presName="space" presStyleCnt="0"/>
+      <dgm:spPr/>
+    </dgm:pt>
+    <dgm:pt modelId="{1F77D1AA-3944-4C50-B87C-0EA0B2159593}" type="pres">
+      <dgm:prSet presAssocID="{71E82913-291C-4747-9E0D-E26FBCCAC453}" presName="compositeB" presStyleCnt="0"/>
+      <dgm:spPr/>
+    </dgm:pt>
+    <dgm:pt modelId="{5807F4F2-0443-4295-97A8-373A86B2C4AF}" type="pres">
+      <dgm:prSet presAssocID="{71E82913-291C-4747-9E0D-E26FBCCAC453}" presName="textB" presStyleLbl="revTx" presStyleIdx="1" presStyleCnt="5" custLinFactY="-50000" custLinFactNeighborX="-1324" custLinFactNeighborY="-100000">
+        <dgm:presLayoutVars>
+          <dgm:bulletEnabled val="1"/>
+        </dgm:presLayoutVars>
+      </dgm:prSet>
+      <dgm:spPr/>
+      <dgm:t>
+        <a:bodyPr/>
+        <a:lstStyle/>
+        <a:p>
+          <a:endParaRPr lang="de-DE"/>
+        </a:p>
+      </dgm:t>
+    </dgm:pt>
     <dgm:pt modelId="{3390B0D5-AE1A-4F2A-BB66-6CE85BAE12B8}" type="pres">
       <dgm:prSet presAssocID="{71E82913-291C-4747-9E0D-E26FBCCAC453}" presName="circleB" presStyleLbl="node1" presStyleIdx="1" presStyleCnt="5"/>
       <dgm:spPr/>
@@ -10122,6 +10242,13 @@
         </dgm:presLayoutVars>
       </dgm:prSet>
       <dgm:spPr/>
+      <dgm:t>
+        <a:bodyPr/>
+        <a:lstStyle/>
+        <a:p>
+          <a:endParaRPr lang="de-DE"/>
+        </a:p>
+      </dgm:t>
     </dgm:pt>
     <dgm:pt modelId="{6127A24A-86B8-4753-A36D-94B3824E5DCE}" type="pres">
       <dgm:prSet presAssocID="{E358C221-9508-4421-8C3E-C14A1766DA97}" presName="circleA" presStyleLbl="node1" presStyleIdx="2" presStyleCnt="5"/>
@@ -10146,6 +10273,13 @@
         </dgm:presLayoutVars>
       </dgm:prSet>
       <dgm:spPr/>
+      <dgm:t>
+        <a:bodyPr/>
+        <a:lstStyle/>
+        <a:p>
+          <a:endParaRPr lang="de-DE"/>
+        </a:p>
+      </dgm:t>
     </dgm:pt>
     <dgm:pt modelId="{EE50FC0A-1800-4B55-A6F5-CD88882CD84D}" type="pres">
       <dgm:prSet presAssocID="{263D1932-C914-44FA-91E5-7404EFB65698}" presName="circleB" presStyleLbl="node1" presStyleIdx="3" presStyleCnt="5"/>
@@ -10170,6 +10304,13 @@
         </dgm:presLayoutVars>
       </dgm:prSet>
       <dgm:spPr/>
+      <dgm:t>
+        <a:bodyPr/>
+        <a:lstStyle/>
+        <a:p>
+          <a:endParaRPr lang="de-DE"/>
+        </a:p>
+      </dgm:t>
     </dgm:pt>
     <dgm:pt modelId="{56D082C5-8BA8-46CA-814D-30BD0AEEB51B}" type="pres">
       <dgm:prSet presAssocID="{863FD00F-879C-40D8-BCA7-9630CC06DBCD}" presName="circleA" presStyleLbl="node1" presStyleIdx="4" presStyleCnt="5"/>
@@ -10181,16 +10322,16 @@
     </dgm:pt>
   </dgm:ptLst>
   <dgm:cxnLst>
+    <dgm:cxn modelId="{ADBD6E20-D458-469A-8B8F-91BF534D2428}" srcId="{C092B36E-43EF-43DF-B7ED-BB22C399B9C8}" destId="{863FD00F-879C-40D8-BCA7-9630CC06DBCD}" srcOrd="4" destOrd="0" parTransId="{B6A65A5C-8787-4C53-9C97-F3BBE5F9D64B}" sibTransId="{A62A90A8-4011-4E6E-BDF2-E2F20594EA71}"/>
+    <dgm:cxn modelId="{26EAE784-FDBA-4F2C-A934-763F4534CD4F}" type="presOf" srcId="{836F97C4-3741-4FD9-B961-3F6BCC913225}" destId="{AFCA00F9-252C-4474-BE2C-CDC264E45F31}" srcOrd="0" destOrd="0" presId="urn:microsoft.com/office/officeart/2005/8/layout/hProcess11"/>
     <dgm:cxn modelId="{CD7EFF94-CB87-42B1-84E2-328D0179B2BC}" srcId="{C092B36E-43EF-43DF-B7ED-BB22C399B9C8}" destId="{71E82913-291C-4747-9E0D-E26FBCCAC453}" srcOrd="1" destOrd="0" parTransId="{D4102208-5784-4A71-BCF3-4FD7C550F880}" sibTransId="{9161E376-61B5-442C-8808-1A33E1B3A3EE}"/>
-    <dgm:cxn modelId="{8493648B-8E25-43FD-A310-CB48C8494A92}" type="presOf" srcId="{263D1932-C914-44FA-91E5-7404EFB65698}" destId="{42CB6A0C-9D4D-4270-88D8-F3F1DA46DAD1}" srcOrd="0" destOrd="0" presId="urn:microsoft.com/office/officeart/2005/8/layout/hProcess11"/>
-    <dgm:cxn modelId="{B3F07E16-EC13-435C-A14B-D61CC385E3FE}" type="presOf" srcId="{863FD00F-879C-40D8-BCA7-9630CC06DBCD}" destId="{12962CA2-D647-49BD-81FC-E786EBED1DED}" srcOrd="0" destOrd="0" presId="urn:microsoft.com/office/officeart/2005/8/layout/hProcess11"/>
-    <dgm:cxn modelId="{ADBD6E20-D458-469A-8B8F-91BF534D2428}" srcId="{C092B36E-43EF-43DF-B7ED-BB22C399B9C8}" destId="{863FD00F-879C-40D8-BCA7-9630CC06DBCD}" srcOrd="4" destOrd="0" parTransId="{B6A65A5C-8787-4C53-9C97-F3BBE5F9D64B}" sibTransId="{A62A90A8-4011-4E6E-BDF2-E2F20594EA71}"/>
+    <dgm:cxn modelId="{8C6C3010-D28B-4798-AB59-DD28EAACF830}" type="presOf" srcId="{71E82913-291C-4747-9E0D-E26FBCCAC453}" destId="{5807F4F2-0443-4295-97A8-373A86B2C4AF}" srcOrd="0" destOrd="0" presId="urn:microsoft.com/office/officeart/2005/8/layout/hProcess11"/>
     <dgm:cxn modelId="{D3D4CC29-94CB-4FEC-B7A2-95AABE289EDC}" srcId="{C092B36E-43EF-43DF-B7ED-BB22C399B9C8}" destId="{263D1932-C914-44FA-91E5-7404EFB65698}" srcOrd="3" destOrd="0" parTransId="{609100EC-FE04-4491-9FC7-FB2D7B8A9EA8}" sibTransId="{B2FFFAB1-8BB1-4D03-83F8-F71DB4C1EB98}"/>
-    <dgm:cxn modelId="{A4D45F1E-77BC-4DF4-88BA-43780E9D9E21}" srcId="{C092B36E-43EF-43DF-B7ED-BB22C399B9C8}" destId="{836F97C4-3741-4FD9-B961-3F6BCC913225}" srcOrd="0" destOrd="0" parTransId="{A9D208C0-0805-49DE-B527-ED47A66A62E8}" sibTransId="{2999D138-02E1-4A62-85C1-A1728A2A3B07}"/>
-    <dgm:cxn modelId="{26EAE784-FDBA-4F2C-A934-763F4534CD4F}" type="presOf" srcId="{836F97C4-3741-4FD9-B961-3F6BCC913225}" destId="{AFCA00F9-252C-4474-BE2C-CDC264E45F31}" srcOrd="0" destOrd="0" presId="urn:microsoft.com/office/officeart/2005/8/layout/hProcess11"/>
     <dgm:cxn modelId="{444BC8A6-CC92-4716-AD7A-1647DC438B4F}" type="presOf" srcId="{C092B36E-43EF-43DF-B7ED-BB22C399B9C8}" destId="{1F9F75E3-3329-4491-8611-F9A888AE0E3A}" srcOrd="0" destOrd="0" presId="urn:microsoft.com/office/officeart/2005/8/layout/hProcess11"/>
     <dgm:cxn modelId="{D9193E44-1AB3-4F32-A1B5-CD2692CA8866}" type="presOf" srcId="{E358C221-9508-4421-8C3E-C14A1766DA97}" destId="{AB7EF6B0-8311-4A2B-9782-76F6027EC317}" srcOrd="0" destOrd="0" presId="urn:microsoft.com/office/officeart/2005/8/layout/hProcess11"/>
-    <dgm:cxn modelId="{8C6C3010-D28B-4798-AB59-DD28EAACF830}" type="presOf" srcId="{71E82913-291C-4747-9E0D-E26FBCCAC453}" destId="{5807F4F2-0443-4295-97A8-373A86B2C4AF}" srcOrd="0" destOrd="0" presId="urn:microsoft.com/office/officeart/2005/8/layout/hProcess11"/>
+    <dgm:cxn modelId="{B3F07E16-EC13-435C-A14B-D61CC385E3FE}" type="presOf" srcId="{863FD00F-879C-40D8-BCA7-9630CC06DBCD}" destId="{12962CA2-D647-49BD-81FC-E786EBED1DED}" srcOrd="0" destOrd="0" presId="urn:microsoft.com/office/officeart/2005/8/layout/hProcess11"/>
+    <dgm:cxn modelId="{8493648B-8E25-43FD-A310-CB48C8494A92}" type="presOf" srcId="{263D1932-C914-44FA-91E5-7404EFB65698}" destId="{42CB6A0C-9D4D-4270-88D8-F3F1DA46DAD1}" srcOrd="0" destOrd="0" presId="urn:microsoft.com/office/officeart/2005/8/layout/hProcess11"/>
+    <dgm:cxn modelId="{A4D45F1E-77BC-4DF4-88BA-43780E9D9E21}" srcId="{C092B36E-43EF-43DF-B7ED-BB22C399B9C8}" destId="{836F97C4-3741-4FD9-B961-3F6BCC913225}" srcOrd="0" destOrd="0" parTransId="{A9D208C0-0805-49DE-B527-ED47A66A62E8}" sibTransId="{2999D138-02E1-4A62-85C1-A1728A2A3B07}"/>
     <dgm:cxn modelId="{B46074B0-180B-4AC5-B3AE-BD285482D9DE}" srcId="{C092B36E-43EF-43DF-B7ED-BB22C399B9C8}" destId="{E358C221-9508-4421-8C3E-C14A1766DA97}" srcOrd="2" destOrd="0" parTransId="{94F7D42F-D15B-404F-9D18-207381EC79A2}" sibTransId="{CD746562-A3E3-40F1-A1C0-E862C98D93BC}"/>
     <dgm:cxn modelId="{80DD6595-2C36-4B09-98AE-A464FDA4BC2E}" type="presParOf" srcId="{1F9F75E3-3329-4491-8611-F9A888AE0E3A}" destId="{4AB9A1D7-027D-4EA5-B85D-2A0F7127070F}" srcOrd="0" destOrd="0" presId="urn:microsoft.com/office/officeart/2005/8/layout/hProcess11"/>
     <dgm:cxn modelId="{E743DBBB-20AF-4757-9882-9EAED11D9F0F}" type="presParOf" srcId="{1F9F75E3-3329-4491-8611-F9A888AE0E3A}" destId="{3EBEE75B-F854-49BE-8D44-C587FA288C70}" srcOrd="1" destOrd="0" presId="urn:microsoft.com/office/officeart/2005/8/layout/hProcess11"/>
@@ -10520,50 +10661,6 @@
         </dgm:presLayoutVars>
       </dgm:prSet>
       <dgm:spPr/>
-    </dgm:pt>
-    <dgm:pt modelId="{4AB9A1D7-027D-4EA5-B85D-2A0F7127070F}" type="pres">
-      <dgm:prSet presAssocID="{C092B36E-43EF-43DF-B7ED-BB22C399B9C8}" presName="arrow" presStyleLbl="bgShp" presStyleIdx="0" presStyleCnt="1" custScaleX="91490"/>
-      <dgm:spPr/>
-    </dgm:pt>
-    <dgm:pt modelId="{3EBEE75B-F854-49BE-8D44-C587FA288C70}" type="pres">
-      <dgm:prSet presAssocID="{C092B36E-43EF-43DF-B7ED-BB22C399B9C8}" presName="points" presStyleCnt="0"/>
-      <dgm:spPr/>
-    </dgm:pt>
-    <dgm:pt modelId="{266DB7BC-080A-4953-A2FB-855B1140DE5A}" type="pres">
-      <dgm:prSet presAssocID="{836F97C4-3741-4FD9-B961-3F6BCC913225}" presName="compositeA" presStyleCnt="0"/>
-      <dgm:spPr/>
-    </dgm:pt>
-    <dgm:pt modelId="{AFCA00F9-252C-4474-BE2C-CDC264E45F31}" type="pres">
-      <dgm:prSet presAssocID="{836F97C4-3741-4FD9-B961-3F6BCC913225}" presName="textA" presStyleLbl="revTx" presStyleIdx="0" presStyleCnt="5">
-        <dgm:presLayoutVars>
-          <dgm:bulletEnabled val="1"/>
-        </dgm:presLayoutVars>
-      </dgm:prSet>
-      <dgm:spPr/>
-    </dgm:pt>
-    <dgm:pt modelId="{C39E104A-B3E2-4B8C-A982-8C8DED6454EC}" type="pres">
-      <dgm:prSet presAssocID="{836F97C4-3741-4FD9-B961-3F6BCC913225}" presName="circleA" presStyleLbl="node1" presStyleIdx="0" presStyleCnt="5"/>
-      <dgm:spPr/>
-    </dgm:pt>
-    <dgm:pt modelId="{C791E6BA-5654-40CE-921D-1829DAC31EAA}" type="pres">
-      <dgm:prSet presAssocID="{836F97C4-3741-4FD9-B961-3F6BCC913225}" presName="spaceA" presStyleCnt="0"/>
-      <dgm:spPr/>
-    </dgm:pt>
-    <dgm:pt modelId="{47ABDAB3-8F7A-485E-B11A-A1136BE795C9}" type="pres">
-      <dgm:prSet presAssocID="{2999D138-02E1-4A62-85C1-A1728A2A3B07}" presName="space" presStyleCnt="0"/>
-      <dgm:spPr/>
-    </dgm:pt>
-    <dgm:pt modelId="{1F77D1AA-3944-4C50-B87C-0EA0B2159593}" type="pres">
-      <dgm:prSet presAssocID="{71E82913-291C-4747-9E0D-E26FBCCAC453}" presName="compositeB" presStyleCnt="0"/>
-      <dgm:spPr/>
-    </dgm:pt>
-    <dgm:pt modelId="{5807F4F2-0443-4295-97A8-373A86B2C4AF}" type="pres">
-      <dgm:prSet presAssocID="{71E82913-291C-4747-9E0D-E26FBCCAC453}" presName="textB" presStyleLbl="revTx" presStyleIdx="1" presStyleCnt="5" custLinFactY="-50000" custLinFactNeighborX="-1324" custLinFactNeighborY="-100000">
-        <dgm:presLayoutVars>
-          <dgm:bulletEnabled val="1"/>
-        </dgm:presLayoutVars>
-      </dgm:prSet>
-      <dgm:spPr/>
       <dgm:t>
         <a:bodyPr/>
         <a:lstStyle/>
@@ -10572,6 +10669,64 @@
         </a:p>
       </dgm:t>
     </dgm:pt>
+    <dgm:pt modelId="{4AB9A1D7-027D-4EA5-B85D-2A0F7127070F}" type="pres">
+      <dgm:prSet presAssocID="{C092B36E-43EF-43DF-B7ED-BB22C399B9C8}" presName="arrow" presStyleLbl="bgShp" presStyleIdx="0" presStyleCnt="1" custScaleX="91490"/>
+      <dgm:spPr/>
+    </dgm:pt>
+    <dgm:pt modelId="{3EBEE75B-F854-49BE-8D44-C587FA288C70}" type="pres">
+      <dgm:prSet presAssocID="{C092B36E-43EF-43DF-B7ED-BB22C399B9C8}" presName="points" presStyleCnt="0"/>
+      <dgm:spPr/>
+    </dgm:pt>
+    <dgm:pt modelId="{266DB7BC-080A-4953-A2FB-855B1140DE5A}" type="pres">
+      <dgm:prSet presAssocID="{836F97C4-3741-4FD9-B961-3F6BCC913225}" presName="compositeA" presStyleCnt="0"/>
+      <dgm:spPr/>
+    </dgm:pt>
+    <dgm:pt modelId="{AFCA00F9-252C-4474-BE2C-CDC264E45F31}" type="pres">
+      <dgm:prSet presAssocID="{836F97C4-3741-4FD9-B961-3F6BCC913225}" presName="textA" presStyleLbl="revTx" presStyleIdx="0" presStyleCnt="5">
+        <dgm:presLayoutVars>
+          <dgm:bulletEnabled val="1"/>
+        </dgm:presLayoutVars>
+      </dgm:prSet>
+      <dgm:spPr/>
+      <dgm:t>
+        <a:bodyPr/>
+        <a:lstStyle/>
+        <a:p>
+          <a:endParaRPr lang="de-DE"/>
+        </a:p>
+      </dgm:t>
+    </dgm:pt>
+    <dgm:pt modelId="{C39E104A-B3E2-4B8C-A982-8C8DED6454EC}" type="pres">
+      <dgm:prSet presAssocID="{836F97C4-3741-4FD9-B961-3F6BCC913225}" presName="circleA" presStyleLbl="node1" presStyleIdx="0" presStyleCnt="5"/>
+      <dgm:spPr/>
+    </dgm:pt>
+    <dgm:pt modelId="{C791E6BA-5654-40CE-921D-1829DAC31EAA}" type="pres">
+      <dgm:prSet presAssocID="{836F97C4-3741-4FD9-B961-3F6BCC913225}" presName="spaceA" presStyleCnt="0"/>
+      <dgm:spPr/>
+    </dgm:pt>
+    <dgm:pt modelId="{47ABDAB3-8F7A-485E-B11A-A1136BE795C9}" type="pres">
+      <dgm:prSet presAssocID="{2999D138-02E1-4A62-85C1-A1728A2A3B07}" presName="space" presStyleCnt="0"/>
+      <dgm:spPr/>
+    </dgm:pt>
+    <dgm:pt modelId="{1F77D1AA-3944-4C50-B87C-0EA0B2159593}" type="pres">
+      <dgm:prSet presAssocID="{71E82913-291C-4747-9E0D-E26FBCCAC453}" presName="compositeB" presStyleCnt="0"/>
+      <dgm:spPr/>
+    </dgm:pt>
+    <dgm:pt modelId="{5807F4F2-0443-4295-97A8-373A86B2C4AF}" type="pres">
+      <dgm:prSet presAssocID="{71E82913-291C-4747-9E0D-E26FBCCAC453}" presName="textB" presStyleLbl="revTx" presStyleIdx="1" presStyleCnt="5" custLinFactY="-50000" custLinFactNeighborX="-1324" custLinFactNeighborY="-100000">
+        <dgm:presLayoutVars>
+          <dgm:bulletEnabled val="1"/>
+        </dgm:presLayoutVars>
+      </dgm:prSet>
+      <dgm:spPr/>
+      <dgm:t>
+        <a:bodyPr/>
+        <a:lstStyle/>
+        <a:p>
+          <a:endParaRPr lang="de-DE"/>
+        </a:p>
+      </dgm:t>
+    </dgm:pt>
     <dgm:pt modelId="{3390B0D5-AE1A-4F2A-BB66-6CE85BAE12B8}" type="pres">
       <dgm:prSet presAssocID="{71E82913-291C-4747-9E0D-E26FBCCAC453}" presName="circleB" presStyleLbl="node1" presStyleIdx="1" presStyleCnt="5"/>
       <dgm:spPr/>
@@ -10595,6 +10750,13 @@
         </dgm:presLayoutVars>
       </dgm:prSet>
       <dgm:spPr/>
+      <dgm:t>
+        <a:bodyPr/>
+        <a:lstStyle/>
+        <a:p>
+          <a:endParaRPr lang="de-DE"/>
+        </a:p>
+      </dgm:t>
     </dgm:pt>
     <dgm:pt modelId="{6127A24A-86B8-4753-A36D-94B3824E5DCE}" type="pres">
       <dgm:prSet presAssocID="{E358C221-9508-4421-8C3E-C14A1766DA97}" presName="circleA" presStyleLbl="node1" presStyleIdx="2" presStyleCnt="5"/>
@@ -10619,6 +10781,13 @@
         </dgm:presLayoutVars>
       </dgm:prSet>
       <dgm:spPr/>
+      <dgm:t>
+        <a:bodyPr/>
+        <a:lstStyle/>
+        <a:p>
+          <a:endParaRPr lang="de-DE"/>
+        </a:p>
+      </dgm:t>
     </dgm:pt>
     <dgm:pt modelId="{EE50FC0A-1800-4B55-A6F5-CD88882CD84D}" type="pres">
       <dgm:prSet presAssocID="{263D1932-C914-44FA-91E5-7404EFB65698}" presName="circleB" presStyleLbl="node1" presStyleIdx="3" presStyleCnt="5"/>
@@ -10643,6 +10812,13 @@
         </dgm:presLayoutVars>
       </dgm:prSet>
       <dgm:spPr/>
+      <dgm:t>
+        <a:bodyPr/>
+        <a:lstStyle/>
+        <a:p>
+          <a:endParaRPr lang="de-DE"/>
+        </a:p>
+      </dgm:t>
     </dgm:pt>
     <dgm:pt modelId="{56D082C5-8BA8-46CA-814D-30BD0AEEB51B}" type="pres">
       <dgm:prSet presAssocID="{863FD00F-879C-40D8-BCA7-9630CC06DBCD}" presName="circleA" presStyleLbl="node1" presStyleIdx="4" presStyleCnt="5"/>
@@ -10654,43 +10830,43 @@
     </dgm:pt>
   </dgm:ptLst>
   <dgm:cxnLst>
-    <dgm:cxn modelId="{B256DD78-4C84-451B-A056-41B63154C209}" type="presOf" srcId="{263D1932-C914-44FA-91E5-7404EFB65698}" destId="{42CB6A0C-9D4D-4270-88D8-F3F1DA46DAD1}" srcOrd="0" destOrd="0" presId="urn:microsoft.com/office/officeart/2005/8/layout/hProcess11"/>
-    <dgm:cxn modelId="{65F6F295-D2E0-4285-AD25-B9972F1D733C}" type="presOf" srcId="{863FD00F-879C-40D8-BCA7-9630CC06DBCD}" destId="{12962CA2-D647-49BD-81FC-E786EBED1DED}" srcOrd="0" destOrd="0" presId="urn:microsoft.com/office/officeart/2005/8/layout/hProcess11"/>
     <dgm:cxn modelId="{ADBD6E20-D458-469A-8B8F-91BF534D2428}" srcId="{C092B36E-43EF-43DF-B7ED-BB22C399B9C8}" destId="{863FD00F-879C-40D8-BCA7-9630CC06DBCD}" srcOrd="4" destOrd="0" parTransId="{B6A65A5C-8787-4C53-9C97-F3BBE5F9D64B}" sibTransId="{A62A90A8-4011-4E6E-BDF2-E2F20594EA71}"/>
-    <dgm:cxn modelId="{8E98C0FC-B3EB-4416-AEFD-0E1F853A843B}" type="presOf" srcId="{836F97C4-3741-4FD9-B961-3F6BCC913225}" destId="{AFCA00F9-252C-4474-BE2C-CDC264E45F31}" srcOrd="0" destOrd="0" presId="urn:microsoft.com/office/officeart/2005/8/layout/hProcess11"/>
     <dgm:cxn modelId="{CD7EFF94-CB87-42B1-84E2-328D0179B2BC}" srcId="{C092B36E-43EF-43DF-B7ED-BB22C399B9C8}" destId="{71E82913-291C-4747-9E0D-E26FBCCAC453}" srcOrd="1" destOrd="0" parTransId="{D4102208-5784-4A71-BCF3-4FD7C550F880}" sibTransId="{9161E376-61B5-442C-8808-1A33E1B3A3EE}"/>
     <dgm:cxn modelId="{D3D4CC29-94CB-4FEC-B7A2-95AABE289EDC}" srcId="{C092B36E-43EF-43DF-B7ED-BB22C399B9C8}" destId="{263D1932-C914-44FA-91E5-7404EFB65698}" srcOrd="3" destOrd="0" parTransId="{609100EC-FE04-4491-9FC7-FB2D7B8A9EA8}" sibTransId="{B2FFFAB1-8BB1-4D03-83F8-F71DB4C1EB98}"/>
-    <dgm:cxn modelId="{A3CCA07D-20F5-425F-BBF1-3BDE3831B832}" type="presOf" srcId="{C092B36E-43EF-43DF-B7ED-BB22C399B9C8}" destId="{1F9F75E3-3329-4491-8611-F9A888AE0E3A}" srcOrd="0" destOrd="0" presId="urn:microsoft.com/office/officeart/2005/8/layout/hProcess11"/>
-    <dgm:cxn modelId="{24D81FF6-F7AA-45A7-AD2A-3D3D95250522}" type="presOf" srcId="{E358C221-9508-4421-8C3E-C14A1766DA97}" destId="{AB7EF6B0-8311-4A2B-9782-76F6027EC317}" srcOrd="0" destOrd="0" presId="urn:microsoft.com/office/officeart/2005/8/layout/hProcess11"/>
-    <dgm:cxn modelId="{7BC37A66-B3DE-454E-8206-B992B2117498}" type="presOf" srcId="{71E82913-291C-4747-9E0D-E26FBCCAC453}" destId="{5807F4F2-0443-4295-97A8-373A86B2C4AF}" srcOrd="0" destOrd="0" presId="urn:microsoft.com/office/officeart/2005/8/layout/hProcess11"/>
+    <dgm:cxn modelId="{CC34AD94-38ED-4434-BFC4-9BBA7C914EFF}" type="presOf" srcId="{71E82913-291C-4747-9E0D-E26FBCCAC453}" destId="{5807F4F2-0443-4295-97A8-373A86B2C4AF}" srcOrd="0" destOrd="0" presId="urn:microsoft.com/office/officeart/2005/8/layout/hProcess11"/>
+    <dgm:cxn modelId="{444D54EB-CAA1-4211-8AB3-68C78DCD7DA2}" type="presOf" srcId="{E358C221-9508-4421-8C3E-C14A1766DA97}" destId="{AB7EF6B0-8311-4A2B-9782-76F6027EC317}" srcOrd="0" destOrd="0" presId="urn:microsoft.com/office/officeart/2005/8/layout/hProcess11"/>
+    <dgm:cxn modelId="{0919B4AB-888B-4DC7-9AB6-82BCDB758BA5}" type="presOf" srcId="{836F97C4-3741-4FD9-B961-3F6BCC913225}" destId="{AFCA00F9-252C-4474-BE2C-CDC264E45F31}" srcOrd="0" destOrd="0" presId="urn:microsoft.com/office/officeart/2005/8/layout/hProcess11"/>
+    <dgm:cxn modelId="{6C7DCE64-A183-4098-AF65-BC98B5486C0E}" type="presOf" srcId="{863FD00F-879C-40D8-BCA7-9630CC06DBCD}" destId="{12962CA2-D647-49BD-81FC-E786EBED1DED}" srcOrd="0" destOrd="0" presId="urn:microsoft.com/office/officeart/2005/8/layout/hProcess11"/>
+    <dgm:cxn modelId="{90FB1653-F0EB-4C9A-B7CC-41632F50E630}" type="presOf" srcId="{C092B36E-43EF-43DF-B7ED-BB22C399B9C8}" destId="{1F9F75E3-3329-4491-8611-F9A888AE0E3A}" srcOrd="0" destOrd="0" presId="urn:microsoft.com/office/officeart/2005/8/layout/hProcess11"/>
+    <dgm:cxn modelId="{1C6556BB-EB5C-4424-92D1-B479BC6242AE}" type="presOf" srcId="{263D1932-C914-44FA-91E5-7404EFB65698}" destId="{42CB6A0C-9D4D-4270-88D8-F3F1DA46DAD1}" srcOrd="0" destOrd="0" presId="urn:microsoft.com/office/officeart/2005/8/layout/hProcess11"/>
     <dgm:cxn modelId="{A4D45F1E-77BC-4DF4-88BA-43780E9D9E21}" srcId="{C092B36E-43EF-43DF-B7ED-BB22C399B9C8}" destId="{836F97C4-3741-4FD9-B961-3F6BCC913225}" srcOrd="0" destOrd="0" parTransId="{A9D208C0-0805-49DE-B527-ED47A66A62E8}" sibTransId="{2999D138-02E1-4A62-85C1-A1728A2A3B07}"/>
     <dgm:cxn modelId="{B46074B0-180B-4AC5-B3AE-BD285482D9DE}" srcId="{C092B36E-43EF-43DF-B7ED-BB22C399B9C8}" destId="{E358C221-9508-4421-8C3E-C14A1766DA97}" srcOrd="2" destOrd="0" parTransId="{94F7D42F-D15B-404F-9D18-207381EC79A2}" sibTransId="{CD746562-A3E3-40F1-A1C0-E862C98D93BC}"/>
-    <dgm:cxn modelId="{BB2A4BE5-0D64-4B4B-BABC-5687BCC8EF74}" type="presParOf" srcId="{1F9F75E3-3329-4491-8611-F9A888AE0E3A}" destId="{4AB9A1D7-027D-4EA5-B85D-2A0F7127070F}" srcOrd="0" destOrd="0" presId="urn:microsoft.com/office/officeart/2005/8/layout/hProcess11"/>
-    <dgm:cxn modelId="{5E6E9FA4-A8AC-4073-B7EB-618BD9FE1F70}" type="presParOf" srcId="{1F9F75E3-3329-4491-8611-F9A888AE0E3A}" destId="{3EBEE75B-F854-49BE-8D44-C587FA288C70}" srcOrd="1" destOrd="0" presId="urn:microsoft.com/office/officeart/2005/8/layout/hProcess11"/>
-    <dgm:cxn modelId="{C49A342D-1DD3-4404-BBA6-041F65047A51}" type="presParOf" srcId="{3EBEE75B-F854-49BE-8D44-C587FA288C70}" destId="{266DB7BC-080A-4953-A2FB-855B1140DE5A}" srcOrd="0" destOrd="0" presId="urn:microsoft.com/office/officeart/2005/8/layout/hProcess11"/>
-    <dgm:cxn modelId="{61E14889-E559-4664-88CB-E1D924251D2B}" type="presParOf" srcId="{266DB7BC-080A-4953-A2FB-855B1140DE5A}" destId="{AFCA00F9-252C-4474-BE2C-CDC264E45F31}" srcOrd="0" destOrd="0" presId="urn:microsoft.com/office/officeart/2005/8/layout/hProcess11"/>
-    <dgm:cxn modelId="{32DB61A7-DCB2-4747-B293-A0CAC16DAC23}" type="presParOf" srcId="{266DB7BC-080A-4953-A2FB-855B1140DE5A}" destId="{C39E104A-B3E2-4B8C-A982-8C8DED6454EC}" srcOrd="1" destOrd="0" presId="urn:microsoft.com/office/officeart/2005/8/layout/hProcess11"/>
-    <dgm:cxn modelId="{7A92E566-508B-4FB9-9419-DEE5D6959222}" type="presParOf" srcId="{266DB7BC-080A-4953-A2FB-855B1140DE5A}" destId="{C791E6BA-5654-40CE-921D-1829DAC31EAA}" srcOrd="2" destOrd="0" presId="urn:microsoft.com/office/officeart/2005/8/layout/hProcess11"/>
-    <dgm:cxn modelId="{65DBE69A-4A5E-4EDB-B3D0-6AA185FC7CE0}" type="presParOf" srcId="{3EBEE75B-F854-49BE-8D44-C587FA288C70}" destId="{47ABDAB3-8F7A-485E-B11A-A1136BE795C9}" srcOrd="1" destOrd="0" presId="urn:microsoft.com/office/officeart/2005/8/layout/hProcess11"/>
-    <dgm:cxn modelId="{185D0AE5-4B12-4526-9EED-A633551771C7}" type="presParOf" srcId="{3EBEE75B-F854-49BE-8D44-C587FA288C70}" destId="{1F77D1AA-3944-4C50-B87C-0EA0B2159593}" srcOrd="2" destOrd="0" presId="urn:microsoft.com/office/officeart/2005/8/layout/hProcess11"/>
-    <dgm:cxn modelId="{B2FBF599-71A9-4019-A345-59525D38550B}" type="presParOf" srcId="{1F77D1AA-3944-4C50-B87C-0EA0B2159593}" destId="{5807F4F2-0443-4295-97A8-373A86B2C4AF}" srcOrd="0" destOrd="0" presId="urn:microsoft.com/office/officeart/2005/8/layout/hProcess11"/>
-    <dgm:cxn modelId="{2B6AAE32-D974-47E1-A0FF-C9DEE93A9942}" type="presParOf" srcId="{1F77D1AA-3944-4C50-B87C-0EA0B2159593}" destId="{3390B0D5-AE1A-4F2A-BB66-6CE85BAE12B8}" srcOrd="1" destOrd="0" presId="urn:microsoft.com/office/officeart/2005/8/layout/hProcess11"/>
-    <dgm:cxn modelId="{4E186E2B-7D6F-47E5-BF00-B564671E1753}" type="presParOf" srcId="{1F77D1AA-3944-4C50-B87C-0EA0B2159593}" destId="{24A5EF36-7D2C-449E-AB8A-E232740D425A}" srcOrd="2" destOrd="0" presId="urn:microsoft.com/office/officeart/2005/8/layout/hProcess11"/>
-    <dgm:cxn modelId="{B7186CB8-73A5-4B30-AD7E-83E293CD2FED}" type="presParOf" srcId="{3EBEE75B-F854-49BE-8D44-C587FA288C70}" destId="{F6B4B428-775B-403F-A42F-644B4366259B}" srcOrd="3" destOrd="0" presId="urn:microsoft.com/office/officeart/2005/8/layout/hProcess11"/>
-    <dgm:cxn modelId="{97F6D7DA-86D1-48D7-8ABB-11450F6C922B}" type="presParOf" srcId="{3EBEE75B-F854-49BE-8D44-C587FA288C70}" destId="{13B9134F-C455-4BA9-A839-BBF4D9C3B562}" srcOrd="4" destOrd="0" presId="urn:microsoft.com/office/officeart/2005/8/layout/hProcess11"/>
-    <dgm:cxn modelId="{73CAFBA2-1BCE-4518-885E-469BF29B9FF6}" type="presParOf" srcId="{13B9134F-C455-4BA9-A839-BBF4D9C3B562}" destId="{AB7EF6B0-8311-4A2B-9782-76F6027EC317}" srcOrd="0" destOrd="0" presId="urn:microsoft.com/office/officeart/2005/8/layout/hProcess11"/>
-    <dgm:cxn modelId="{EE85CB1C-526C-4410-AFE5-BC90B2916D44}" type="presParOf" srcId="{13B9134F-C455-4BA9-A839-BBF4D9C3B562}" destId="{6127A24A-86B8-4753-A36D-94B3824E5DCE}" srcOrd="1" destOrd="0" presId="urn:microsoft.com/office/officeart/2005/8/layout/hProcess11"/>
-    <dgm:cxn modelId="{3E042B7E-DCB3-49FF-A33D-BD5AA6B10C61}" type="presParOf" srcId="{13B9134F-C455-4BA9-A839-BBF4D9C3B562}" destId="{1C8D49DC-E766-4026-9DE3-971B678C46EF}" srcOrd="2" destOrd="0" presId="urn:microsoft.com/office/officeart/2005/8/layout/hProcess11"/>
-    <dgm:cxn modelId="{DED800BD-0508-434F-890E-AC4E23B503D4}" type="presParOf" srcId="{3EBEE75B-F854-49BE-8D44-C587FA288C70}" destId="{BCB69AE6-298E-4DEA-914D-EE15939F342E}" srcOrd="5" destOrd="0" presId="urn:microsoft.com/office/officeart/2005/8/layout/hProcess11"/>
-    <dgm:cxn modelId="{AF156C95-A6A7-4381-9EC6-4C136126B01B}" type="presParOf" srcId="{3EBEE75B-F854-49BE-8D44-C587FA288C70}" destId="{16B019E1-9654-4D9C-AE79-B18602324D8B}" srcOrd="6" destOrd="0" presId="urn:microsoft.com/office/officeart/2005/8/layout/hProcess11"/>
-    <dgm:cxn modelId="{165B21BD-007C-4E43-AA49-469E8C373FEA}" type="presParOf" srcId="{16B019E1-9654-4D9C-AE79-B18602324D8B}" destId="{42CB6A0C-9D4D-4270-88D8-F3F1DA46DAD1}" srcOrd="0" destOrd="0" presId="urn:microsoft.com/office/officeart/2005/8/layout/hProcess11"/>
-    <dgm:cxn modelId="{D237299F-A67D-4C34-BF52-FE634CC99115}" type="presParOf" srcId="{16B019E1-9654-4D9C-AE79-B18602324D8B}" destId="{EE50FC0A-1800-4B55-A6F5-CD88882CD84D}" srcOrd="1" destOrd="0" presId="urn:microsoft.com/office/officeart/2005/8/layout/hProcess11"/>
-    <dgm:cxn modelId="{E1A7756B-AB2E-4B90-9ABE-A362424DC329}" type="presParOf" srcId="{16B019E1-9654-4D9C-AE79-B18602324D8B}" destId="{B5B4FA11-279F-4F53-80EA-2CA314D6A882}" srcOrd="2" destOrd="0" presId="urn:microsoft.com/office/officeart/2005/8/layout/hProcess11"/>
-    <dgm:cxn modelId="{92D8AB03-E32F-4AF3-869C-B0CA16461D5B}" type="presParOf" srcId="{3EBEE75B-F854-49BE-8D44-C587FA288C70}" destId="{2228F9C4-ECF0-46CB-BD59-8182ED9C1503}" srcOrd="7" destOrd="0" presId="urn:microsoft.com/office/officeart/2005/8/layout/hProcess11"/>
-    <dgm:cxn modelId="{BFC2BCAD-FB35-48D1-96E9-F5D8AB8F5AD3}" type="presParOf" srcId="{3EBEE75B-F854-49BE-8D44-C587FA288C70}" destId="{AE936BCA-8BFB-4ACE-91E1-69A2827573B5}" srcOrd="8" destOrd="0" presId="urn:microsoft.com/office/officeart/2005/8/layout/hProcess11"/>
-    <dgm:cxn modelId="{F504364B-8A50-42A4-B14D-9F070BBC12B3}" type="presParOf" srcId="{AE936BCA-8BFB-4ACE-91E1-69A2827573B5}" destId="{12962CA2-D647-49BD-81FC-E786EBED1DED}" srcOrd="0" destOrd="0" presId="urn:microsoft.com/office/officeart/2005/8/layout/hProcess11"/>
-    <dgm:cxn modelId="{9790E920-F053-457D-A261-7694546A2A58}" type="presParOf" srcId="{AE936BCA-8BFB-4ACE-91E1-69A2827573B5}" destId="{56D082C5-8BA8-46CA-814D-30BD0AEEB51B}" srcOrd="1" destOrd="0" presId="urn:microsoft.com/office/officeart/2005/8/layout/hProcess11"/>
-    <dgm:cxn modelId="{8CA0AB21-649D-409B-B300-7A04B7B503F1}" type="presParOf" srcId="{AE936BCA-8BFB-4ACE-91E1-69A2827573B5}" destId="{08CB8DD0-754A-4464-9C57-89A6C586D21B}" srcOrd="2" destOrd="0" presId="urn:microsoft.com/office/officeart/2005/8/layout/hProcess11"/>
+    <dgm:cxn modelId="{50495F2C-689F-48DB-A84B-ABDA3A4C3E51}" type="presParOf" srcId="{1F9F75E3-3329-4491-8611-F9A888AE0E3A}" destId="{4AB9A1D7-027D-4EA5-B85D-2A0F7127070F}" srcOrd="0" destOrd="0" presId="urn:microsoft.com/office/officeart/2005/8/layout/hProcess11"/>
+    <dgm:cxn modelId="{A7E72873-13DE-423A-8313-45A4CB9D63E6}" type="presParOf" srcId="{1F9F75E3-3329-4491-8611-F9A888AE0E3A}" destId="{3EBEE75B-F854-49BE-8D44-C587FA288C70}" srcOrd="1" destOrd="0" presId="urn:microsoft.com/office/officeart/2005/8/layout/hProcess11"/>
+    <dgm:cxn modelId="{569B46B8-88C3-47E7-AD41-AD820C04604B}" type="presParOf" srcId="{3EBEE75B-F854-49BE-8D44-C587FA288C70}" destId="{266DB7BC-080A-4953-A2FB-855B1140DE5A}" srcOrd="0" destOrd="0" presId="urn:microsoft.com/office/officeart/2005/8/layout/hProcess11"/>
+    <dgm:cxn modelId="{B83E0475-461A-4148-AA17-9C677CC69242}" type="presParOf" srcId="{266DB7BC-080A-4953-A2FB-855B1140DE5A}" destId="{AFCA00F9-252C-4474-BE2C-CDC264E45F31}" srcOrd="0" destOrd="0" presId="urn:microsoft.com/office/officeart/2005/8/layout/hProcess11"/>
+    <dgm:cxn modelId="{766A454C-189E-45A8-B3F9-09D46474F34B}" type="presParOf" srcId="{266DB7BC-080A-4953-A2FB-855B1140DE5A}" destId="{C39E104A-B3E2-4B8C-A982-8C8DED6454EC}" srcOrd="1" destOrd="0" presId="urn:microsoft.com/office/officeart/2005/8/layout/hProcess11"/>
+    <dgm:cxn modelId="{D3ACFB41-CC10-497F-B460-9D5C77D2F6E5}" type="presParOf" srcId="{266DB7BC-080A-4953-A2FB-855B1140DE5A}" destId="{C791E6BA-5654-40CE-921D-1829DAC31EAA}" srcOrd="2" destOrd="0" presId="urn:microsoft.com/office/officeart/2005/8/layout/hProcess11"/>
+    <dgm:cxn modelId="{DCF17527-D490-46CB-8E96-08016E3FE632}" type="presParOf" srcId="{3EBEE75B-F854-49BE-8D44-C587FA288C70}" destId="{47ABDAB3-8F7A-485E-B11A-A1136BE795C9}" srcOrd="1" destOrd="0" presId="urn:microsoft.com/office/officeart/2005/8/layout/hProcess11"/>
+    <dgm:cxn modelId="{4BEF2A3C-B6BB-4C38-BEBB-3CB3F48377C4}" type="presParOf" srcId="{3EBEE75B-F854-49BE-8D44-C587FA288C70}" destId="{1F77D1AA-3944-4C50-B87C-0EA0B2159593}" srcOrd="2" destOrd="0" presId="urn:microsoft.com/office/officeart/2005/8/layout/hProcess11"/>
+    <dgm:cxn modelId="{C53533FE-3BF8-467E-BE78-EB3A27271403}" type="presParOf" srcId="{1F77D1AA-3944-4C50-B87C-0EA0B2159593}" destId="{5807F4F2-0443-4295-97A8-373A86B2C4AF}" srcOrd="0" destOrd="0" presId="urn:microsoft.com/office/officeart/2005/8/layout/hProcess11"/>
+    <dgm:cxn modelId="{3ABE4C76-6FE6-4B50-AE23-6DFB042A4557}" type="presParOf" srcId="{1F77D1AA-3944-4C50-B87C-0EA0B2159593}" destId="{3390B0D5-AE1A-4F2A-BB66-6CE85BAE12B8}" srcOrd="1" destOrd="0" presId="urn:microsoft.com/office/officeart/2005/8/layout/hProcess11"/>
+    <dgm:cxn modelId="{39930A52-366C-4997-9D73-FBD4E18EDA20}" type="presParOf" srcId="{1F77D1AA-3944-4C50-B87C-0EA0B2159593}" destId="{24A5EF36-7D2C-449E-AB8A-E232740D425A}" srcOrd="2" destOrd="0" presId="urn:microsoft.com/office/officeart/2005/8/layout/hProcess11"/>
+    <dgm:cxn modelId="{0F658C1F-8419-446D-8520-7CA515C7FC47}" type="presParOf" srcId="{3EBEE75B-F854-49BE-8D44-C587FA288C70}" destId="{F6B4B428-775B-403F-A42F-644B4366259B}" srcOrd="3" destOrd="0" presId="urn:microsoft.com/office/officeart/2005/8/layout/hProcess11"/>
+    <dgm:cxn modelId="{AB2AC4B2-E868-42EB-958E-0690ADD793BC}" type="presParOf" srcId="{3EBEE75B-F854-49BE-8D44-C587FA288C70}" destId="{13B9134F-C455-4BA9-A839-BBF4D9C3B562}" srcOrd="4" destOrd="0" presId="urn:microsoft.com/office/officeart/2005/8/layout/hProcess11"/>
+    <dgm:cxn modelId="{43539315-709A-4151-9CF7-5450CC86BEC1}" type="presParOf" srcId="{13B9134F-C455-4BA9-A839-BBF4D9C3B562}" destId="{AB7EF6B0-8311-4A2B-9782-76F6027EC317}" srcOrd="0" destOrd="0" presId="urn:microsoft.com/office/officeart/2005/8/layout/hProcess11"/>
+    <dgm:cxn modelId="{98858592-0546-4487-8CAA-39A3C09A196F}" type="presParOf" srcId="{13B9134F-C455-4BA9-A839-BBF4D9C3B562}" destId="{6127A24A-86B8-4753-A36D-94B3824E5DCE}" srcOrd="1" destOrd="0" presId="urn:microsoft.com/office/officeart/2005/8/layout/hProcess11"/>
+    <dgm:cxn modelId="{4DA95E7C-B7DE-4C3A-9321-DC6D7F647A16}" type="presParOf" srcId="{13B9134F-C455-4BA9-A839-BBF4D9C3B562}" destId="{1C8D49DC-E766-4026-9DE3-971B678C46EF}" srcOrd="2" destOrd="0" presId="urn:microsoft.com/office/officeart/2005/8/layout/hProcess11"/>
+    <dgm:cxn modelId="{7DD709AD-9C97-499C-B276-122847EC5694}" type="presParOf" srcId="{3EBEE75B-F854-49BE-8D44-C587FA288C70}" destId="{BCB69AE6-298E-4DEA-914D-EE15939F342E}" srcOrd="5" destOrd="0" presId="urn:microsoft.com/office/officeart/2005/8/layout/hProcess11"/>
+    <dgm:cxn modelId="{5434E4E3-A767-4539-9F70-6878A82F85DA}" type="presParOf" srcId="{3EBEE75B-F854-49BE-8D44-C587FA288C70}" destId="{16B019E1-9654-4D9C-AE79-B18602324D8B}" srcOrd="6" destOrd="0" presId="urn:microsoft.com/office/officeart/2005/8/layout/hProcess11"/>
+    <dgm:cxn modelId="{3DB6C25D-3531-479C-AC13-7A6D6DB50FED}" type="presParOf" srcId="{16B019E1-9654-4D9C-AE79-B18602324D8B}" destId="{42CB6A0C-9D4D-4270-88D8-F3F1DA46DAD1}" srcOrd="0" destOrd="0" presId="urn:microsoft.com/office/officeart/2005/8/layout/hProcess11"/>
+    <dgm:cxn modelId="{249E86FE-24C6-49F6-82DB-B2891A22286A}" type="presParOf" srcId="{16B019E1-9654-4D9C-AE79-B18602324D8B}" destId="{EE50FC0A-1800-4B55-A6F5-CD88882CD84D}" srcOrd="1" destOrd="0" presId="urn:microsoft.com/office/officeart/2005/8/layout/hProcess11"/>
+    <dgm:cxn modelId="{DC543217-E446-4367-AB7C-CE9A6EB9901E}" type="presParOf" srcId="{16B019E1-9654-4D9C-AE79-B18602324D8B}" destId="{B5B4FA11-279F-4F53-80EA-2CA314D6A882}" srcOrd="2" destOrd="0" presId="urn:microsoft.com/office/officeart/2005/8/layout/hProcess11"/>
+    <dgm:cxn modelId="{D2D6750B-FB9A-4CAA-8DA0-0CE590AE3F4E}" type="presParOf" srcId="{3EBEE75B-F854-49BE-8D44-C587FA288C70}" destId="{2228F9C4-ECF0-46CB-BD59-8182ED9C1503}" srcOrd="7" destOrd="0" presId="urn:microsoft.com/office/officeart/2005/8/layout/hProcess11"/>
+    <dgm:cxn modelId="{1198D75B-B18F-45A7-8E2F-E8E7D3D1BCC9}" type="presParOf" srcId="{3EBEE75B-F854-49BE-8D44-C587FA288C70}" destId="{AE936BCA-8BFB-4ACE-91E1-69A2827573B5}" srcOrd="8" destOrd="0" presId="urn:microsoft.com/office/officeart/2005/8/layout/hProcess11"/>
+    <dgm:cxn modelId="{3874BC42-4F60-4115-98F1-AB38C6E2F0A1}" type="presParOf" srcId="{AE936BCA-8BFB-4ACE-91E1-69A2827573B5}" destId="{12962CA2-D647-49BD-81FC-E786EBED1DED}" srcOrd="0" destOrd="0" presId="urn:microsoft.com/office/officeart/2005/8/layout/hProcess11"/>
+    <dgm:cxn modelId="{28D71E65-3647-48D3-8972-E7CFC29EB365}" type="presParOf" srcId="{AE936BCA-8BFB-4ACE-91E1-69A2827573B5}" destId="{56D082C5-8BA8-46CA-814D-30BD0AEEB51B}" srcOrd="1" destOrd="0" presId="urn:microsoft.com/office/officeart/2005/8/layout/hProcess11"/>
+    <dgm:cxn modelId="{44F3FAC5-6F8B-47AA-9493-F6E3C886D8EB}" type="presParOf" srcId="{AE936BCA-8BFB-4ACE-91E1-69A2827573B5}" destId="{08CB8DD0-754A-4464-9C57-89A6C586D21B}" srcOrd="2" destOrd="0" presId="urn:microsoft.com/office/officeart/2005/8/layout/hProcess11"/>
   </dgm:cxnLst>
   <dgm:bg/>
   <dgm:whole/>
@@ -10993,50 +11169,6 @@
         </dgm:presLayoutVars>
       </dgm:prSet>
       <dgm:spPr/>
-    </dgm:pt>
-    <dgm:pt modelId="{4AB9A1D7-027D-4EA5-B85D-2A0F7127070F}" type="pres">
-      <dgm:prSet presAssocID="{C092B36E-43EF-43DF-B7ED-BB22C399B9C8}" presName="arrow" presStyleLbl="bgShp" presStyleIdx="0" presStyleCnt="1" custScaleX="91490"/>
-      <dgm:spPr/>
-    </dgm:pt>
-    <dgm:pt modelId="{3EBEE75B-F854-49BE-8D44-C587FA288C70}" type="pres">
-      <dgm:prSet presAssocID="{C092B36E-43EF-43DF-B7ED-BB22C399B9C8}" presName="points" presStyleCnt="0"/>
-      <dgm:spPr/>
-    </dgm:pt>
-    <dgm:pt modelId="{266DB7BC-080A-4953-A2FB-855B1140DE5A}" type="pres">
-      <dgm:prSet presAssocID="{836F97C4-3741-4FD9-B961-3F6BCC913225}" presName="compositeA" presStyleCnt="0"/>
-      <dgm:spPr/>
-    </dgm:pt>
-    <dgm:pt modelId="{AFCA00F9-252C-4474-BE2C-CDC264E45F31}" type="pres">
-      <dgm:prSet presAssocID="{836F97C4-3741-4FD9-B961-3F6BCC913225}" presName="textA" presStyleLbl="revTx" presStyleIdx="0" presStyleCnt="5">
-        <dgm:presLayoutVars>
-          <dgm:bulletEnabled val="1"/>
-        </dgm:presLayoutVars>
-      </dgm:prSet>
-      <dgm:spPr/>
-    </dgm:pt>
-    <dgm:pt modelId="{C39E104A-B3E2-4B8C-A982-8C8DED6454EC}" type="pres">
-      <dgm:prSet presAssocID="{836F97C4-3741-4FD9-B961-3F6BCC913225}" presName="circleA" presStyleLbl="node1" presStyleIdx="0" presStyleCnt="5"/>
-      <dgm:spPr/>
-    </dgm:pt>
-    <dgm:pt modelId="{C791E6BA-5654-40CE-921D-1829DAC31EAA}" type="pres">
-      <dgm:prSet presAssocID="{836F97C4-3741-4FD9-B961-3F6BCC913225}" presName="spaceA" presStyleCnt="0"/>
-      <dgm:spPr/>
-    </dgm:pt>
-    <dgm:pt modelId="{47ABDAB3-8F7A-485E-B11A-A1136BE795C9}" type="pres">
-      <dgm:prSet presAssocID="{2999D138-02E1-4A62-85C1-A1728A2A3B07}" presName="space" presStyleCnt="0"/>
-      <dgm:spPr/>
-    </dgm:pt>
-    <dgm:pt modelId="{1F77D1AA-3944-4C50-B87C-0EA0B2159593}" type="pres">
-      <dgm:prSet presAssocID="{71E82913-291C-4747-9E0D-E26FBCCAC453}" presName="compositeB" presStyleCnt="0"/>
-      <dgm:spPr/>
-    </dgm:pt>
-    <dgm:pt modelId="{5807F4F2-0443-4295-97A8-373A86B2C4AF}" type="pres">
-      <dgm:prSet presAssocID="{71E82913-291C-4747-9E0D-E26FBCCAC453}" presName="textB" presStyleLbl="revTx" presStyleIdx="1" presStyleCnt="5" custLinFactY="-50000" custLinFactNeighborX="-1324" custLinFactNeighborY="-100000">
-        <dgm:presLayoutVars>
-          <dgm:bulletEnabled val="1"/>
-        </dgm:presLayoutVars>
-      </dgm:prSet>
-      <dgm:spPr/>
       <dgm:t>
         <a:bodyPr/>
         <a:lstStyle/>
@@ -11045,6 +11177,64 @@
         </a:p>
       </dgm:t>
     </dgm:pt>
+    <dgm:pt modelId="{4AB9A1D7-027D-4EA5-B85D-2A0F7127070F}" type="pres">
+      <dgm:prSet presAssocID="{C092B36E-43EF-43DF-B7ED-BB22C399B9C8}" presName="arrow" presStyleLbl="bgShp" presStyleIdx="0" presStyleCnt="1" custScaleX="91490"/>
+      <dgm:spPr/>
+    </dgm:pt>
+    <dgm:pt modelId="{3EBEE75B-F854-49BE-8D44-C587FA288C70}" type="pres">
+      <dgm:prSet presAssocID="{C092B36E-43EF-43DF-B7ED-BB22C399B9C8}" presName="points" presStyleCnt="0"/>
+      <dgm:spPr/>
+    </dgm:pt>
+    <dgm:pt modelId="{266DB7BC-080A-4953-A2FB-855B1140DE5A}" type="pres">
+      <dgm:prSet presAssocID="{836F97C4-3741-4FD9-B961-3F6BCC913225}" presName="compositeA" presStyleCnt="0"/>
+      <dgm:spPr/>
+    </dgm:pt>
+    <dgm:pt modelId="{AFCA00F9-252C-4474-BE2C-CDC264E45F31}" type="pres">
+      <dgm:prSet presAssocID="{836F97C4-3741-4FD9-B961-3F6BCC913225}" presName="textA" presStyleLbl="revTx" presStyleIdx="0" presStyleCnt="5">
+        <dgm:presLayoutVars>
+          <dgm:bulletEnabled val="1"/>
+        </dgm:presLayoutVars>
+      </dgm:prSet>
+      <dgm:spPr/>
+      <dgm:t>
+        <a:bodyPr/>
+        <a:lstStyle/>
+        <a:p>
+          <a:endParaRPr lang="de-DE"/>
+        </a:p>
+      </dgm:t>
+    </dgm:pt>
+    <dgm:pt modelId="{C39E104A-B3E2-4B8C-A982-8C8DED6454EC}" type="pres">
+      <dgm:prSet presAssocID="{836F97C4-3741-4FD9-B961-3F6BCC913225}" presName="circleA" presStyleLbl="node1" presStyleIdx="0" presStyleCnt="5"/>
+      <dgm:spPr/>
+    </dgm:pt>
+    <dgm:pt modelId="{C791E6BA-5654-40CE-921D-1829DAC31EAA}" type="pres">
+      <dgm:prSet presAssocID="{836F97C4-3741-4FD9-B961-3F6BCC913225}" presName="spaceA" presStyleCnt="0"/>
+      <dgm:spPr/>
+    </dgm:pt>
+    <dgm:pt modelId="{47ABDAB3-8F7A-485E-B11A-A1136BE795C9}" type="pres">
+      <dgm:prSet presAssocID="{2999D138-02E1-4A62-85C1-A1728A2A3B07}" presName="space" presStyleCnt="0"/>
+      <dgm:spPr/>
+    </dgm:pt>
+    <dgm:pt modelId="{1F77D1AA-3944-4C50-B87C-0EA0B2159593}" type="pres">
+      <dgm:prSet presAssocID="{71E82913-291C-4747-9E0D-E26FBCCAC453}" presName="compositeB" presStyleCnt="0"/>
+      <dgm:spPr/>
+    </dgm:pt>
+    <dgm:pt modelId="{5807F4F2-0443-4295-97A8-373A86B2C4AF}" type="pres">
+      <dgm:prSet presAssocID="{71E82913-291C-4747-9E0D-E26FBCCAC453}" presName="textB" presStyleLbl="revTx" presStyleIdx="1" presStyleCnt="5" custLinFactY="-50000" custLinFactNeighborX="-1324" custLinFactNeighborY="-100000">
+        <dgm:presLayoutVars>
+          <dgm:bulletEnabled val="1"/>
+        </dgm:presLayoutVars>
+      </dgm:prSet>
+      <dgm:spPr/>
+      <dgm:t>
+        <a:bodyPr/>
+        <a:lstStyle/>
+        <a:p>
+          <a:endParaRPr lang="de-DE"/>
+        </a:p>
+      </dgm:t>
+    </dgm:pt>
     <dgm:pt modelId="{3390B0D5-AE1A-4F2A-BB66-6CE85BAE12B8}" type="pres">
       <dgm:prSet presAssocID="{71E82913-291C-4747-9E0D-E26FBCCAC453}" presName="circleB" presStyleLbl="node1" presStyleIdx="1" presStyleCnt="5"/>
       <dgm:spPr/>
@@ -11068,6 +11258,13 @@
         </dgm:presLayoutVars>
       </dgm:prSet>
       <dgm:spPr/>
+      <dgm:t>
+        <a:bodyPr/>
+        <a:lstStyle/>
+        <a:p>
+          <a:endParaRPr lang="de-DE"/>
+        </a:p>
+      </dgm:t>
     </dgm:pt>
     <dgm:pt modelId="{6127A24A-86B8-4753-A36D-94B3824E5DCE}" type="pres">
       <dgm:prSet presAssocID="{E358C221-9508-4421-8C3E-C14A1766DA97}" presName="circleA" presStyleLbl="node1" presStyleIdx="2" presStyleCnt="5"/>
@@ -11092,6 +11289,13 @@
         </dgm:presLayoutVars>
       </dgm:prSet>
       <dgm:spPr/>
+      <dgm:t>
+        <a:bodyPr/>
+        <a:lstStyle/>
+        <a:p>
+          <a:endParaRPr lang="de-DE"/>
+        </a:p>
+      </dgm:t>
     </dgm:pt>
     <dgm:pt modelId="{EE50FC0A-1800-4B55-A6F5-CD88882CD84D}" type="pres">
       <dgm:prSet presAssocID="{263D1932-C914-44FA-91E5-7404EFB65698}" presName="circleB" presStyleLbl="node1" presStyleIdx="3" presStyleCnt="5"/>
@@ -11116,6 +11320,13 @@
         </dgm:presLayoutVars>
       </dgm:prSet>
       <dgm:spPr/>
+      <dgm:t>
+        <a:bodyPr/>
+        <a:lstStyle/>
+        <a:p>
+          <a:endParaRPr lang="de-DE"/>
+        </a:p>
+      </dgm:t>
     </dgm:pt>
     <dgm:pt modelId="{56D082C5-8BA8-46CA-814D-30BD0AEEB51B}" type="pres">
       <dgm:prSet presAssocID="{863FD00F-879C-40D8-BCA7-9630CC06DBCD}" presName="circleA" presStyleLbl="node1" presStyleIdx="4" presStyleCnt="5"/>
@@ -11136,8 +11347,8 @@
     <dgm:cxn modelId="{0484F1DB-6161-4DCD-BE83-E60510ECFAD5}" type="presOf" srcId="{C092B36E-43EF-43DF-B7ED-BB22C399B9C8}" destId="{1F9F75E3-3329-4491-8611-F9A888AE0E3A}" srcOrd="0" destOrd="0" presId="urn:microsoft.com/office/officeart/2005/8/layout/hProcess11"/>
     <dgm:cxn modelId="{92C16C6F-06AE-415F-B6D9-72E3C4EF8CD2}" type="presOf" srcId="{263D1932-C914-44FA-91E5-7404EFB65698}" destId="{42CB6A0C-9D4D-4270-88D8-F3F1DA46DAD1}" srcOrd="0" destOrd="0" presId="urn:microsoft.com/office/officeart/2005/8/layout/hProcess11"/>
     <dgm:cxn modelId="{50020A5D-CDC9-4ED3-875C-0D52D339B601}" type="presOf" srcId="{E358C221-9508-4421-8C3E-C14A1766DA97}" destId="{AB7EF6B0-8311-4A2B-9782-76F6027EC317}" srcOrd="0" destOrd="0" presId="urn:microsoft.com/office/officeart/2005/8/layout/hProcess11"/>
+    <dgm:cxn modelId="{A4D45F1E-77BC-4DF4-88BA-43780E9D9E21}" srcId="{C092B36E-43EF-43DF-B7ED-BB22C399B9C8}" destId="{836F97C4-3741-4FD9-B961-3F6BCC913225}" srcOrd="0" destOrd="0" parTransId="{A9D208C0-0805-49DE-B527-ED47A66A62E8}" sibTransId="{2999D138-02E1-4A62-85C1-A1728A2A3B07}"/>
     <dgm:cxn modelId="{B46074B0-180B-4AC5-B3AE-BD285482D9DE}" srcId="{C092B36E-43EF-43DF-B7ED-BB22C399B9C8}" destId="{E358C221-9508-4421-8C3E-C14A1766DA97}" srcOrd="2" destOrd="0" parTransId="{94F7D42F-D15B-404F-9D18-207381EC79A2}" sibTransId="{CD746562-A3E3-40F1-A1C0-E862C98D93BC}"/>
-    <dgm:cxn modelId="{A4D45F1E-77BC-4DF4-88BA-43780E9D9E21}" srcId="{C092B36E-43EF-43DF-B7ED-BB22C399B9C8}" destId="{836F97C4-3741-4FD9-B961-3F6BCC913225}" srcOrd="0" destOrd="0" parTransId="{A9D208C0-0805-49DE-B527-ED47A66A62E8}" sibTransId="{2999D138-02E1-4A62-85C1-A1728A2A3B07}"/>
     <dgm:cxn modelId="{9CD55B8A-EDF4-4A27-A921-AB6312FFC67C}" type="presParOf" srcId="{1F9F75E3-3329-4491-8611-F9A888AE0E3A}" destId="{4AB9A1D7-027D-4EA5-B85D-2A0F7127070F}" srcOrd="0" destOrd="0" presId="urn:microsoft.com/office/officeart/2005/8/layout/hProcess11"/>
     <dgm:cxn modelId="{0DF38D50-D874-4C31-8D2D-4B0C26210C5F}" type="presParOf" srcId="{1F9F75E3-3329-4491-8611-F9A888AE0E3A}" destId="{3EBEE75B-F854-49BE-8D44-C587FA288C70}" srcOrd="1" destOrd="0" presId="urn:microsoft.com/office/officeart/2005/8/layout/hProcess11"/>
     <dgm:cxn modelId="{F61E3796-507F-49B1-8BA0-D0F0117B4AFE}" type="presParOf" srcId="{3EBEE75B-F854-49BE-8D44-C587FA288C70}" destId="{266DB7BC-080A-4953-A2FB-855B1140DE5A}" srcOrd="0" destOrd="0" presId="urn:microsoft.com/office/officeart/2005/8/layout/hProcess11"/>
@@ -11466,50 +11677,6 @@
         </dgm:presLayoutVars>
       </dgm:prSet>
       <dgm:spPr/>
-    </dgm:pt>
-    <dgm:pt modelId="{4AB9A1D7-027D-4EA5-B85D-2A0F7127070F}" type="pres">
-      <dgm:prSet presAssocID="{C092B36E-43EF-43DF-B7ED-BB22C399B9C8}" presName="arrow" presStyleLbl="bgShp" presStyleIdx="0" presStyleCnt="1" custScaleX="91490"/>
-      <dgm:spPr/>
-    </dgm:pt>
-    <dgm:pt modelId="{3EBEE75B-F854-49BE-8D44-C587FA288C70}" type="pres">
-      <dgm:prSet presAssocID="{C092B36E-43EF-43DF-B7ED-BB22C399B9C8}" presName="points" presStyleCnt="0"/>
-      <dgm:spPr/>
-    </dgm:pt>
-    <dgm:pt modelId="{266DB7BC-080A-4953-A2FB-855B1140DE5A}" type="pres">
-      <dgm:prSet presAssocID="{836F97C4-3741-4FD9-B961-3F6BCC913225}" presName="compositeA" presStyleCnt="0"/>
-      <dgm:spPr/>
-    </dgm:pt>
-    <dgm:pt modelId="{AFCA00F9-252C-4474-BE2C-CDC264E45F31}" type="pres">
-      <dgm:prSet presAssocID="{836F97C4-3741-4FD9-B961-3F6BCC913225}" presName="textA" presStyleLbl="revTx" presStyleIdx="0" presStyleCnt="5">
-        <dgm:presLayoutVars>
-          <dgm:bulletEnabled val="1"/>
-        </dgm:presLayoutVars>
-      </dgm:prSet>
-      <dgm:spPr/>
-    </dgm:pt>
-    <dgm:pt modelId="{C39E104A-B3E2-4B8C-A982-8C8DED6454EC}" type="pres">
-      <dgm:prSet presAssocID="{836F97C4-3741-4FD9-B961-3F6BCC913225}" presName="circleA" presStyleLbl="node1" presStyleIdx="0" presStyleCnt="5"/>
-      <dgm:spPr/>
-    </dgm:pt>
-    <dgm:pt modelId="{C791E6BA-5654-40CE-921D-1829DAC31EAA}" type="pres">
-      <dgm:prSet presAssocID="{836F97C4-3741-4FD9-B961-3F6BCC913225}" presName="spaceA" presStyleCnt="0"/>
-      <dgm:spPr/>
-    </dgm:pt>
-    <dgm:pt modelId="{47ABDAB3-8F7A-485E-B11A-A1136BE795C9}" type="pres">
-      <dgm:prSet presAssocID="{2999D138-02E1-4A62-85C1-A1728A2A3B07}" presName="space" presStyleCnt="0"/>
-      <dgm:spPr/>
-    </dgm:pt>
-    <dgm:pt modelId="{1F77D1AA-3944-4C50-B87C-0EA0B2159593}" type="pres">
-      <dgm:prSet presAssocID="{71E82913-291C-4747-9E0D-E26FBCCAC453}" presName="compositeB" presStyleCnt="0"/>
-      <dgm:spPr/>
-    </dgm:pt>
-    <dgm:pt modelId="{5807F4F2-0443-4295-97A8-373A86B2C4AF}" type="pres">
-      <dgm:prSet presAssocID="{71E82913-291C-4747-9E0D-E26FBCCAC453}" presName="textB" presStyleLbl="revTx" presStyleIdx="1" presStyleCnt="5" custLinFactY="-50000" custLinFactNeighborX="-1324" custLinFactNeighborY="-100000">
-        <dgm:presLayoutVars>
-          <dgm:bulletEnabled val="1"/>
-        </dgm:presLayoutVars>
-      </dgm:prSet>
-      <dgm:spPr/>
       <dgm:t>
         <a:bodyPr/>
         <a:lstStyle/>
@@ -11518,6 +11685,64 @@
         </a:p>
       </dgm:t>
     </dgm:pt>
+    <dgm:pt modelId="{4AB9A1D7-027D-4EA5-B85D-2A0F7127070F}" type="pres">
+      <dgm:prSet presAssocID="{C092B36E-43EF-43DF-B7ED-BB22C399B9C8}" presName="arrow" presStyleLbl="bgShp" presStyleIdx="0" presStyleCnt="1" custScaleX="91490"/>
+      <dgm:spPr/>
+    </dgm:pt>
+    <dgm:pt modelId="{3EBEE75B-F854-49BE-8D44-C587FA288C70}" type="pres">
+      <dgm:prSet presAssocID="{C092B36E-43EF-43DF-B7ED-BB22C399B9C8}" presName="points" presStyleCnt="0"/>
+      <dgm:spPr/>
+    </dgm:pt>
+    <dgm:pt modelId="{266DB7BC-080A-4953-A2FB-855B1140DE5A}" type="pres">
+      <dgm:prSet presAssocID="{836F97C4-3741-4FD9-B961-3F6BCC913225}" presName="compositeA" presStyleCnt="0"/>
+      <dgm:spPr/>
+    </dgm:pt>
+    <dgm:pt modelId="{AFCA00F9-252C-4474-BE2C-CDC264E45F31}" type="pres">
+      <dgm:prSet presAssocID="{836F97C4-3741-4FD9-B961-3F6BCC913225}" presName="textA" presStyleLbl="revTx" presStyleIdx="0" presStyleCnt="5">
+        <dgm:presLayoutVars>
+          <dgm:bulletEnabled val="1"/>
+        </dgm:presLayoutVars>
+      </dgm:prSet>
+      <dgm:spPr/>
+      <dgm:t>
+        <a:bodyPr/>
+        <a:lstStyle/>
+        <a:p>
+          <a:endParaRPr lang="de-DE"/>
+        </a:p>
+      </dgm:t>
+    </dgm:pt>
+    <dgm:pt modelId="{C39E104A-B3E2-4B8C-A982-8C8DED6454EC}" type="pres">
+      <dgm:prSet presAssocID="{836F97C4-3741-4FD9-B961-3F6BCC913225}" presName="circleA" presStyleLbl="node1" presStyleIdx="0" presStyleCnt="5"/>
+      <dgm:spPr/>
+    </dgm:pt>
+    <dgm:pt modelId="{C791E6BA-5654-40CE-921D-1829DAC31EAA}" type="pres">
+      <dgm:prSet presAssocID="{836F97C4-3741-4FD9-B961-3F6BCC913225}" presName="spaceA" presStyleCnt="0"/>
+      <dgm:spPr/>
+    </dgm:pt>
+    <dgm:pt modelId="{47ABDAB3-8F7A-485E-B11A-A1136BE795C9}" type="pres">
+      <dgm:prSet presAssocID="{2999D138-02E1-4A62-85C1-A1728A2A3B07}" presName="space" presStyleCnt="0"/>
+      <dgm:spPr/>
+    </dgm:pt>
+    <dgm:pt modelId="{1F77D1AA-3944-4C50-B87C-0EA0B2159593}" type="pres">
+      <dgm:prSet presAssocID="{71E82913-291C-4747-9E0D-E26FBCCAC453}" presName="compositeB" presStyleCnt="0"/>
+      <dgm:spPr/>
+    </dgm:pt>
+    <dgm:pt modelId="{5807F4F2-0443-4295-97A8-373A86B2C4AF}" type="pres">
+      <dgm:prSet presAssocID="{71E82913-291C-4747-9E0D-E26FBCCAC453}" presName="textB" presStyleLbl="revTx" presStyleIdx="1" presStyleCnt="5" custLinFactY="-50000" custLinFactNeighborX="-1324" custLinFactNeighborY="-100000">
+        <dgm:presLayoutVars>
+          <dgm:bulletEnabled val="1"/>
+        </dgm:presLayoutVars>
+      </dgm:prSet>
+      <dgm:spPr/>
+      <dgm:t>
+        <a:bodyPr/>
+        <a:lstStyle/>
+        <a:p>
+          <a:endParaRPr lang="de-DE"/>
+        </a:p>
+      </dgm:t>
+    </dgm:pt>
     <dgm:pt modelId="{3390B0D5-AE1A-4F2A-BB66-6CE85BAE12B8}" type="pres">
       <dgm:prSet presAssocID="{71E82913-291C-4747-9E0D-E26FBCCAC453}" presName="circleB" presStyleLbl="node1" presStyleIdx="1" presStyleCnt="5"/>
       <dgm:spPr/>
@@ -11541,6 +11766,13 @@
         </dgm:presLayoutVars>
       </dgm:prSet>
       <dgm:spPr/>
+      <dgm:t>
+        <a:bodyPr/>
+        <a:lstStyle/>
+        <a:p>
+          <a:endParaRPr lang="de-DE"/>
+        </a:p>
+      </dgm:t>
     </dgm:pt>
     <dgm:pt modelId="{6127A24A-86B8-4753-A36D-94B3824E5DCE}" type="pres">
       <dgm:prSet presAssocID="{E358C221-9508-4421-8C3E-C14A1766DA97}" presName="circleA" presStyleLbl="node1" presStyleIdx="2" presStyleCnt="5"/>
@@ -11565,6 +11797,13 @@
         </dgm:presLayoutVars>
       </dgm:prSet>
       <dgm:spPr/>
+      <dgm:t>
+        <a:bodyPr/>
+        <a:lstStyle/>
+        <a:p>
+          <a:endParaRPr lang="de-DE"/>
+        </a:p>
+      </dgm:t>
     </dgm:pt>
     <dgm:pt modelId="{EE50FC0A-1800-4B55-A6F5-CD88882CD84D}" type="pres">
       <dgm:prSet presAssocID="{263D1932-C914-44FA-91E5-7404EFB65698}" presName="circleB" presStyleLbl="node1" presStyleIdx="3" presStyleCnt="5"/>
@@ -11589,6 +11828,13 @@
         </dgm:presLayoutVars>
       </dgm:prSet>
       <dgm:spPr/>
+      <dgm:t>
+        <a:bodyPr/>
+        <a:lstStyle/>
+        <a:p>
+          <a:endParaRPr lang="de-DE"/>
+        </a:p>
+      </dgm:t>
     </dgm:pt>
     <dgm:pt modelId="{56D082C5-8BA8-46CA-814D-30BD0AEEB51B}" type="pres">
       <dgm:prSet presAssocID="{863FD00F-879C-40D8-BCA7-9630CC06DBCD}" presName="circleA" presStyleLbl="node1" presStyleIdx="4" presStyleCnt="5"/>
@@ -11939,50 +12185,6 @@
         </dgm:presLayoutVars>
       </dgm:prSet>
       <dgm:spPr/>
-    </dgm:pt>
-    <dgm:pt modelId="{4AB9A1D7-027D-4EA5-B85D-2A0F7127070F}" type="pres">
-      <dgm:prSet presAssocID="{C092B36E-43EF-43DF-B7ED-BB22C399B9C8}" presName="arrow" presStyleLbl="bgShp" presStyleIdx="0" presStyleCnt="1" custScaleX="91490"/>
-      <dgm:spPr/>
-    </dgm:pt>
-    <dgm:pt modelId="{3EBEE75B-F854-49BE-8D44-C587FA288C70}" type="pres">
-      <dgm:prSet presAssocID="{C092B36E-43EF-43DF-B7ED-BB22C399B9C8}" presName="points" presStyleCnt="0"/>
-      <dgm:spPr/>
-    </dgm:pt>
-    <dgm:pt modelId="{266DB7BC-080A-4953-A2FB-855B1140DE5A}" type="pres">
-      <dgm:prSet presAssocID="{836F97C4-3741-4FD9-B961-3F6BCC913225}" presName="compositeA" presStyleCnt="0"/>
-      <dgm:spPr/>
-    </dgm:pt>
-    <dgm:pt modelId="{AFCA00F9-252C-4474-BE2C-CDC264E45F31}" type="pres">
-      <dgm:prSet presAssocID="{836F97C4-3741-4FD9-B961-3F6BCC913225}" presName="textA" presStyleLbl="revTx" presStyleIdx="0" presStyleCnt="5">
-        <dgm:presLayoutVars>
-          <dgm:bulletEnabled val="1"/>
-        </dgm:presLayoutVars>
-      </dgm:prSet>
-      <dgm:spPr/>
-    </dgm:pt>
-    <dgm:pt modelId="{C39E104A-B3E2-4B8C-A982-8C8DED6454EC}" type="pres">
-      <dgm:prSet presAssocID="{836F97C4-3741-4FD9-B961-3F6BCC913225}" presName="circleA" presStyleLbl="node1" presStyleIdx="0" presStyleCnt="5"/>
-      <dgm:spPr/>
-    </dgm:pt>
-    <dgm:pt modelId="{C791E6BA-5654-40CE-921D-1829DAC31EAA}" type="pres">
-      <dgm:prSet presAssocID="{836F97C4-3741-4FD9-B961-3F6BCC913225}" presName="spaceA" presStyleCnt="0"/>
-      <dgm:spPr/>
-    </dgm:pt>
-    <dgm:pt modelId="{47ABDAB3-8F7A-485E-B11A-A1136BE795C9}" type="pres">
-      <dgm:prSet presAssocID="{2999D138-02E1-4A62-85C1-A1728A2A3B07}" presName="space" presStyleCnt="0"/>
-      <dgm:spPr/>
-    </dgm:pt>
-    <dgm:pt modelId="{1F77D1AA-3944-4C50-B87C-0EA0B2159593}" type="pres">
-      <dgm:prSet presAssocID="{71E82913-291C-4747-9E0D-E26FBCCAC453}" presName="compositeB" presStyleCnt="0"/>
-      <dgm:spPr/>
-    </dgm:pt>
-    <dgm:pt modelId="{5807F4F2-0443-4295-97A8-373A86B2C4AF}" type="pres">
-      <dgm:prSet presAssocID="{71E82913-291C-4747-9E0D-E26FBCCAC453}" presName="textB" presStyleLbl="revTx" presStyleIdx="1" presStyleCnt="5" custLinFactY="-50000" custLinFactNeighborX="-1324" custLinFactNeighborY="-100000">
-        <dgm:presLayoutVars>
-          <dgm:bulletEnabled val="1"/>
-        </dgm:presLayoutVars>
-      </dgm:prSet>
-      <dgm:spPr/>
       <dgm:t>
         <a:bodyPr/>
         <a:lstStyle/>
@@ -11991,6 +12193,64 @@
         </a:p>
       </dgm:t>
     </dgm:pt>
+    <dgm:pt modelId="{4AB9A1D7-027D-4EA5-B85D-2A0F7127070F}" type="pres">
+      <dgm:prSet presAssocID="{C092B36E-43EF-43DF-B7ED-BB22C399B9C8}" presName="arrow" presStyleLbl="bgShp" presStyleIdx="0" presStyleCnt="1" custScaleX="91490"/>
+      <dgm:spPr/>
+    </dgm:pt>
+    <dgm:pt modelId="{3EBEE75B-F854-49BE-8D44-C587FA288C70}" type="pres">
+      <dgm:prSet presAssocID="{C092B36E-43EF-43DF-B7ED-BB22C399B9C8}" presName="points" presStyleCnt="0"/>
+      <dgm:spPr/>
+    </dgm:pt>
+    <dgm:pt modelId="{266DB7BC-080A-4953-A2FB-855B1140DE5A}" type="pres">
+      <dgm:prSet presAssocID="{836F97C4-3741-4FD9-B961-3F6BCC913225}" presName="compositeA" presStyleCnt="0"/>
+      <dgm:spPr/>
+    </dgm:pt>
+    <dgm:pt modelId="{AFCA00F9-252C-4474-BE2C-CDC264E45F31}" type="pres">
+      <dgm:prSet presAssocID="{836F97C4-3741-4FD9-B961-3F6BCC913225}" presName="textA" presStyleLbl="revTx" presStyleIdx="0" presStyleCnt="5">
+        <dgm:presLayoutVars>
+          <dgm:bulletEnabled val="1"/>
+        </dgm:presLayoutVars>
+      </dgm:prSet>
+      <dgm:spPr/>
+      <dgm:t>
+        <a:bodyPr/>
+        <a:lstStyle/>
+        <a:p>
+          <a:endParaRPr lang="de-DE"/>
+        </a:p>
+      </dgm:t>
+    </dgm:pt>
+    <dgm:pt modelId="{C39E104A-B3E2-4B8C-A982-8C8DED6454EC}" type="pres">
+      <dgm:prSet presAssocID="{836F97C4-3741-4FD9-B961-3F6BCC913225}" presName="circleA" presStyleLbl="node1" presStyleIdx="0" presStyleCnt="5"/>
+      <dgm:spPr/>
+    </dgm:pt>
+    <dgm:pt modelId="{C791E6BA-5654-40CE-921D-1829DAC31EAA}" type="pres">
+      <dgm:prSet presAssocID="{836F97C4-3741-4FD9-B961-3F6BCC913225}" presName="spaceA" presStyleCnt="0"/>
+      <dgm:spPr/>
+    </dgm:pt>
+    <dgm:pt modelId="{47ABDAB3-8F7A-485E-B11A-A1136BE795C9}" type="pres">
+      <dgm:prSet presAssocID="{2999D138-02E1-4A62-85C1-A1728A2A3B07}" presName="space" presStyleCnt="0"/>
+      <dgm:spPr/>
+    </dgm:pt>
+    <dgm:pt modelId="{1F77D1AA-3944-4C50-B87C-0EA0B2159593}" type="pres">
+      <dgm:prSet presAssocID="{71E82913-291C-4747-9E0D-E26FBCCAC453}" presName="compositeB" presStyleCnt="0"/>
+      <dgm:spPr/>
+    </dgm:pt>
+    <dgm:pt modelId="{5807F4F2-0443-4295-97A8-373A86B2C4AF}" type="pres">
+      <dgm:prSet presAssocID="{71E82913-291C-4747-9E0D-E26FBCCAC453}" presName="textB" presStyleLbl="revTx" presStyleIdx="1" presStyleCnt="5" custLinFactY="-50000" custLinFactNeighborX="-1324" custLinFactNeighborY="-100000">
+        <dgm:presLayoutVars>
+          <dgm:bulletEnabled val="1"/>
+        </dgm:presLayoutVars>
+      </dgm:prSet>
+      <dgm:spPr/>
+      <dgm:t>
+        <a:bodyPr/>
+        <a:lstStyle/>
+        <a:p>
+          <a:endParaRPr lang="de-DE"/>
+        </a:p>
+      </dgm:t>
+    </dgm:pt>
     <dgm:pt modelId="{3390B0D5-AE1A-4F2A-BB66-6CE85BAE12B8}" type="pres">
       <dgm:prSet presAssocID="{71E82913-291C-4747-9E0D-E26FBCCAC453}" presName="circleB" presStyleLbl="node1" presStyleIdx="1" presStyleCnt="5"/>
       <dgm:spPr/>
@@ -12014,6 +12274,13 @@
         </dgm:presLayoutVars>
       </dgm:prSet>
       <dgm:spPr/>
+      <dgm:t>
+        <a:bodyPr/>
+        <a:lstStyle/>
+        <a:p>
+          <a:endParaRPr lang="de-DE"/>
+        </a:p>
+      </dgm:t>
     </dgm:pt>
     <dgm:pt modelId="{6127A24A-86B8-4753-A36D-94B3824E5DCE}" type="pres">
       <dgm:prSet presAssocID="{E358C221-9508-4421-8C3E-C14A1766DA97}" presName="circleA" presStyleLbl="node1" presStyleIdx="2" presStyleCnt="5"/>
@@ -12038,6 +12305,13 @@
         </dgm:presLayoutVars>
       </dgm:prSet>
       <dgm:spPr/>
+      <dgm:t>
+        <a:bodyPr/>
+        <a:lstStyle/>
+        <a:p>
+          <a:endParaRPr lang="de-DE"/>
+        </a:p>
+      </dgm:t>
     </dgm:pt>
     <dgm:pt modelId="{EE50FC0A-1800-4B55-A6F5-CD88882CD84D}" type="pres">
       <dgm:prSet presAssocID="{263D1932-C914-44FA-91E5-7404EFB65698}" presName="circleB" presStyleLbl="node1" presStyleIdx="3" presStyleCnt="5"/>
@@ -12062,6 +12336,13 @@
         </dgm:presLayoutVars>
       </dgm:prSet>
       <dgm:spPr/>
+      <dgm:t>
+        <a:bodyPr/>
+        <a:lstStyle/>
+        <a:p>
+          <a:endParaRPr lang="de-DE"/>
+        </a:p>
+      </dgm:t>
     </dgm:pt>
     <dgm:pt modelId="{56D082C5-8BA8-46CA-814D-30BD0AEEB51B}" type="pres">
       <dgm:prSet presAssocID="{863FD00F-879C-40D8-BCA7-9630CC06DBCD}" presName="circleA" presStyleLbl="node1" presStyleIdx="4" presStyleCnt="5"/>
@@ -12412,50 +12693,6 @@
         </dgm:presLayoutVars>
       </dgm:prSet>
       <dgm:spPr/>
-    </dgm:pt>
-    <dgm:pt modelId="{4AB9A1D7-027D-4EA5-B85D-2A0F7127070F}" type="pres">
-      <dgm:prSet presAssocID="{C092B36E-43EF-43DF-B7ED-BB22C399B9C8}" presName="arrow" presStyleLbl="bgShp" presStyleIdx="0" presStyleCnt="1" custScaleX="91490"/>
-      <dgm:spPr/>
-    </dgm:pt>
-    <dgm:pt modelId="{3EBEE75B-F854-49BE-8D44-C587FA288C70}" type="pres">
-      <dgm:prSet presAssocID="{C092B36E-43EF-43DF-B7ED-BB22C399B9C8}" presName="points" presStyleCnt="0"/>
-      <dgm:spPr/>
-    </dgm:pt>
-    <dgm:pt modelId="{266DB7BC-080A-4953-A2FB-855B1140DE5A}" type="pres">
-      <dgm:prSet presAssocID="{836F97C4-3741-4FD9-B961-3F6BCC913225}" presName="compositeA" presStyleCnt="0"/>
-      <dgm:spPr/>
-    </dgm:pt>
-    <dgm:pt modelId="{AFCA00F9-252C-4474-BE2C-CDC264E45F31}" type="pres">
-      <dgm:prSet presAssocID="{836F97C4-3741-4FD9-B961-3F6BCC913225}" presName="textA" presStyleLbl="revTx" presStyleIdx="0" presStyleCnt="5">
-        <dgm:presLayoutVars>
-          <dgm:bulletEnabled val="1"/>
-        </dgm:presLayoutVars>
-      </dgm:prSet>
-      <dgm:spPr/>
-    </dgm:pt>
-    <dgm:pt modelId="{C39E104A-B3E2-4B8C-A982-8C8DED6454EC}" type="pres">
-      <dgm:prSet presAssocID="{836F97C4-3741-4FD9-B961-3F6BCC913225}" presName="circleA" presStyleLbl="node1" presStyleIdx="0" presStyleCnt="5"/>
-      <dgm:spPr/>
-    </dgm:pt>
-    <dgm:pt modelId="{C791E6BA-5654-40CE-921D-1829DAC31EAA}" type="pres">
-      <dgm:prSet presAssocID="{836F97C4-3741-4FD9-B961-3F6BCC913225}" presName="spaceA" presStyleCnt="0"/>
-      <dgm:spPr/>
-    </dgm:pt>
-    <dgm:pt modelId="{47ABDAB3-8F7A-485E-B11A-A1136BE795C9}" type="pres">
-      <dgm:prSet presAssocID="{2999D138-02E1-4A62-85C1-A1728A2A3B07}" presName="space" presStyleCnt="0"/>
-      <dgm:spPr/>
-    </dgm:pt>
-    <dgm:pt modelId="{1F77D1AA-3944-4C50-B87C-0EA0B2159593}" type="pres">
-      <dgm:prSet presAssocID="{71E82913-291C-4747-9E0D-E26FBCCAC453}" presName="compositeB" presStyleCnt="0"/>
-      <dgm:spPr/>
-    </dgm:pt>
-    <dgm:pt modelId="{5807F4F2-0443-4295-97A8-373A86B2C4AF}" type="pres">
-      <dgm:prSet presAssocID="{71E82913-291C-4747-9E0D-E26FBCCAC453}" presName="textB" presStyleLbl="revTx" presStyleIdx="1" presStyleCnt="5" custLinFactY="-50000" custLinFactNeighborX="-1324" custLinFactNeighborY="-100000">
-        <dgm:presLayoutVars>
-          <dgm:bulletEnabled val="1"/>
-        </dgm:presLayoutVars>
-      </dgm:prSet>
-      <dgm:spPr/>
       <dgm:t>
         <a:bodyPr/>
         <a:lstStyle/>
@@ -12464,6 +12701,64 @@
         </a:p>
       </dgm:t>
     </dgm:pt>
+    <dgm:pt modelId="{4AB9A1D7-027D-4EA5-B85D-2A0F7127070F}" type="pres">
+      <dgm:prSet presAssocID="{C092B36E-43EF-43DF-B7ED-BB22C399B9C8}" presName="arrow" presStyleLbl="bgShp" presStyleIdx="0" presStyleCnt="1" custScaleX="91490"/>
+      <dgm:spPr/>
+    </dgm:pt>
+    <dgm:pt modelId="{3EBEE75B-F854-49BE-8D44-C587FA288C70}" type="pres">
+      <dgm:prSet presAssocID="{C092B36E-43EF-43DF-B7ED-BB22C399B9C8}" presName="points" presStyleCnt="0"/>
+      <dgm:spPr/>
+    </dgm:pt>
+    <dgm:pt modelId="{266DB7BC-080A-4953-A2FB-855B1140DE5A}" type="pres">
+      <dgm:prSet presAssocID="{836F97C4-3741-4FD9-B961-3F6BCC913225}" presName="compositeA" presStyleCnt="0"/>
+      <dgm:spPr/>
+    </dgm:pt>
+    <dgm:pt modelId="{AFCA00F9-252C-4474-BE2C-CDC264E45F31}" type="pres">
+      <dgm:prSet presAssocID="{836F97C4-3741-4FD9-B961-3F6BCC913225}" presName="textA" presStyleLbl="revTx" presStyleIdx="0" presStyleCnt="5">
+        <dgm:presLayoutVars>
+          <dgm:bulletEnabled val="1"/>
+        </dgm:presLayoutVars>
+      </dgm:prSet>
+      <dgm:spPr/>
+      <dgm:t>
+        <a:bodyPr/>
+        <a:lstStyle/>
+        <a:p>
+          <a:endParaRPr lang="de-DE"/>
+        </a:p>
+      </dgm:t>
+    </dgm:pt>
+    <dgm:pt modelId="{C39E104A-B3E2-4B8C-A982-8C8DED6454EC}" type="pres">
+      <dgm:prSet presAssocID="{836F97C4-3741-4FD9-B961-3F6BCC913225}" presName="circleA" presStyleLbl="node1" presStyleIdx="0" presStyleCnt="5"/>
+      <dgm:spPr/>
+    </dgm:pt>
+    <dgm:pt modelId="{C791E6BA-5654-40CE-921D-1829DAC31EAA}" type="pres">
+      <dgm:prSet presAssocID="{836F97C4-3741-4FD9-B961-3F6BCC913225}" presName="spaceA" presStyleCnt="0"/>
+      <dgm:spPr/>
+    </dgm:pt>
+    <dgm:pt modelId="{47ABDAB3-8F7A-485E-B11A-A1136BE795C9}" type="pres">
+      <dgm:prSet presAssocID="{2999D138-02E1-4A62-85C1-A1728A2A3B07}" presName="space" presStyleCnt="0"/>
+      <dgm:spPr/>
+    </dgm:pt>
+    <dgm:pt modelId="{1F77D1AA-3944-4C50-B87C-0EA0B2159593}" type="pres">
+      <dgm:prSet presAssocID="{71E82913-291C-4747-9E0D-E26FBCCAC453}" presName="compositeB" presStyleCnt="0"/>
+      <dgm:spPr/>
+    </dgm:pt>
+    <dgm:pt modelId="{5807F4F2-0443-4295-97A8-373A86B2C4AF}" type="pres">
+      <dgm:prSet presAssocID="{71E82913-291C-4747-9E0D-E26FBCCAC453}" presName="textB" presStyleLbl="revTx" presStyleIdx="1" presStyleCnt="5" custLinFactY="-50000" custLinFactNeighborX="-1324" custLinFactNeighborY="-100000">
+        <dgm:presLayoutVars>
+          <dgm:bulletEnabled val="1"/>
+        </dgm:presLayoutVars>
+      </dgm:prSet>
+      <dgm:spPr/>
+      <dgm:t>
+        <a:bodyPr/>
+        <a:lstStyle/>
+        <a:p>
+          <a:endParaRPr lang="de-DE"/>
+        </a:p>
+      </dgm:t>
+    </dgm:pt>
     <dgm:pt modelId="{3390B0D5-AE1A-4F2A-BB66-6CE85BAE12B8}" type="pres">
       <dgm:prSet presAssocID="{71E82913-291C-4747-9E0D-E26FBCCAC453}" presName="circleB" presStyleLbl="node1" presStyleIdx="1" presStyleCnt="5"/>
       <dgm:spPr/>
@@ -12487,6 +12782,13 @@
         </dgm:presLayoutVars>
       </dgm:prSet>
       <dgm:spPr/>
+      <dgm:t>
+        <a:bodyPr/>
+        <a:lstStyle/>
+        <a:p>
+          <a:endParaRPr lang="de-DE"/>
+        </a:p>
+      </dgm:t>
     </dgm:pt>
     <dgm:pt modelId="{6127A24A-86B8-4753-A36D-94B3824E5DCE}" type="pres">
       <dgm:prSet presAssocID="{E358C221-9508-4421-8C3E-C14A1766DA97}" presName="circleA" presStyleLbl="node1" presStyleIdx="2" presStyleCnt="5"/>
@@ -12511,6 +12813,13 @@
         </dgm:presLayoutVars>
       </dgm:prSet>
       <dgm:spPr/>
+      <dgm:t>
+        <a:bodyPr/>
+        <a:lstStyle/>
+        <a:p>
+          <a:endParaRPr lang="de-DE"/>
+        </a:p>
+      </dgm:t>
     </dgm:pt>
     <dgm:pt modelId="{EE50FC0A-1800-4B55-A6F5-CD88882CD84D}" type="pres">
       <dgm:prSet presAssocID="{263D1932-C914-44FA-91E5-7404EFB65698}" presName="circleB" presStyleLbl="node1" presStyleIdx="3" presStyleCnt="5"/>
@@ -12535,6 +12844,13 @@
         </dgm:presLayoutVars>
       </dgm:prSet>
       <dgm:spPr/>
+      <dgm:t>
+        <a:bodyPr/>
+        <a:lstStyle/>
+        <a:p>
+          <a:endParaRPr lang="de-DE"/>
+        </a:p>
+      </dgm:t>
     </dgm:pt>
     <dgm:pt modelId="{56D082C5-8BA8-46CA-814D-30BD0AEEB51B}" type="pres">
       <dgm:prSet presAssocID="{863FD00F-879C-40D8-BCA7-9630CC06DBCD}" presName="circleA" presStyleLbl="node1" presStyleIdx="4" presStyleCnt="5"/>
@@ -12885,50 +13201,6 @@
         </dgm:presLayoutVars>
       </dgm:prSet>
       <dgm:spPr/>
-    </dgm:pt>
-    <dgm:pt modelId="{4AB9A1D7-027D-4EA5-B85D-2A0F7127070F}" type="pres">
-      <dgm:prSet presAssocID="{C092B36E-43EF-43DF-B7ED-BB22C399B9C8}" presName="arrow" presStyleLbl="bgShp" presStyleIdx="0" presStyleCnt="1" custScaleX="91490"/>
-      <dgm:spPr/>
-    </dgm:pt>
-    <dgm:pt modelId="{3EBEE75B-F854-49BE-8D44-C587FA288C70}" type="pres">
-      <dgm:prSet presAssocID="{C092B36E-43EF-43DF-B7ED-BB22C399B9C8}" presName="points" presStyleCnt="0"/>
-      <dgm:spPr/>
-    </dgm:pt>
-    <dgm:pt modelId="{266DB7BC-080A-4953-A2FB-855B1140DE5A}" type="pres">
-      <dgm:prSet presAssocID="{836F97C4-3741-4FD9-B961-3F6BCC913225}" presName="compositeA" presStyleCnt="0"/>
-      <dgm:spPr/>
-    </dgm:pt>
-    <dgm:pt modelId="{AFCA00F9-252C-4474-BE2C-CDC264E45F31}" type="pres">
-      <dgm:prSet presAssocID="{836F97C4-3741-4FD9-B961-3F6BCC913225}" presName="textA" presStyleLbl="revTx" presStyleIdx="0" presStyleCnt="5">
-        <dgm:presLayoutVars>
-          <dgm:bulletEnabled val="1"/>
-        </dgm:presLayoutVars>
-      </dgm:prSet>
-      <dgm:spPr/>
-    </dgm:pt>
-    <dgm:pt modelId="{C39E104A-B3E2-4B8C-A982-8C8DED6454EC}" type="pres">
-      <dgm:prSet presAssocID="{836F97C4-3741-4FD9-B961-3F6BCC913225}" presName="circleA" presStyleLbl="node1" presStyleIdx="0" presStyleCnt="5"/>
-      <dgm:spPr/>
-    </dgm:pt>
-    <dgm:pt modelId="{C791E6BA-5654-40CE-921D-1829DAC31EAA}" type="pres">
-      <dgm:prSet presAssocID="{836F97C4-3741-4FD9-B961-3F6BCC913225}" presName="spaceA" presStyleCnt="0"/>
-      <dgm:spPr/>
-    </dgm:pt>
-    <dgm:pt modelId="{47ABDAB3-8F7A-485E-B11A-A1136BE795C9}" type="pres">
-      <dgm:prSet presAssocID="{2999D138-02E1-4A62-85C1-A1728A2A3B07}" presName="space" presStyleCnt="0"/>
-      <dgm:spPr/>
-    </dgm:pt>
-    <dgm:pt modelId="{1F77D1AA-3944-4C50-B87C-0EA0B2159593}" type="pres">
-      <dgm:prSet presAssocID="{71E82913-291C-4747-9E0D-E26FBCCAC453}" presName="compositeB" presStyleCnt="0"/>
-      <dgm:spPr/>
-    </dgm:pt>
-    <dgm:pt modelId="{5807F4F2-0443-4295-97A8-373A86B2C4AF}" type="pres">
-      <dgm:prSet presAssocID="{71E82913-291C-4747-9E0D-E26FBCCAC453}" presName="textB" presStyleLbl="revTx" presStyleIdx="1" presStyleCnt="5" custLinFactY="-50000" custLinFactNeighborX="-1324" custLinFactNeighborY="-100000">
-        <dgm:presLayoutVars>
-          <dgm:bulletEnabled val="1"/>
-        </dgm:presLayoutVars>
-      </dgm:prSet>
-      <dgm:spPr/>
       <dgm:t>
         <a:bodyPr/>
         <a:lstStyle/>
@@ -12937,6 +13209,64 @@
         </a:p>
       </dgm:t>
     </dgm:pt>
+    <dgm:pt modelId="{4AB9A1D7-027D-4EA5-B85D-2A0F7127070F}" type="pres">
+      <dgm:prSet presAssocID="{C092B36E-43EF-43DF-B7ED-BB22C399B9C8}" presName="arrow" presStyleLbl="bgShp" presStyleIdx="0" presStyleCnt="1" custScaleX="91490"/>
+      <dgm:spPr/>
+    </dgm:pt>
+    <dgm:pt modelId="{3EBEE75B-F854-49BE-8D44-C587FA288C70}" type="pres">
+      <dgm:prSet presAssocID="{C092B36E-43EF-43DF-B7ED-BB22C399B9C8}" presName="points" presStyleCnt="0"/>
+      <dgm:spPr/>
+    </dgm:pt>
+    <dgm:pt modelId="{266DB7BC-080A-4953-A2FB-855B1140DE5A}" type="pres">
+      <dgm:prSet presAssocID="{836F97C4-3741-4FD9-B961-3F6BCC913225}" presName="compositeA" presStyleCnt="0"/>
+      <dgm:spPr/>
+    </dgm:pt>
+    <dgm:pt modelId="{AFCA00F9-252C-4474-BE2C-CDC264E45F31}" type="pres">
+      <dgm:prSet presAssocID="{836F97C4-3741-4FD9-B961-3F6BCC913225}" presName="textA" presStyleLbl="revTx" presStyleIdx="0" presStyleCnt="5">
+        <dgm:presLayoutVars>
+          <dgm:bulletEnabled val="1"/>
+        </dgm:presLayoutVars>
+      </dgm:prSet>
+      <dgm:spPr/>
+      <dgm:t>
+        <a:bodyPr/>
+        <a:lstStyle/>
+        <a:p>
+          <a:endParaRPr lang="de-DE"/>
+        </a:p>
+      </dgm:t>
+    </dgm:pt>
+    <dgm:pt modelId="{C39E104A-B3E2-4B8C-A982-8C8DED6454EC}" type="pres">
+      <dgm:prSet presAssocID="{836F97C4-3741-4FD9-B961-3F6BCC913225}" presName="circleA" presStyleLbl="node1" presStyleIdx="0" presStyleCnt="5"/>
+      <dgm:spPr/>
+    </dgm:pt>
+    <dgm:pt modelId="{C791E6BA-5654-40CE-921D-1829DAC31EAA}" type="pres">
+      <dgm:prSet presAssocID="{836F97C4-3741-4FD9-B961-3F6BCC913225}" presName="spaceA" presStyleCnt="0"/>
+      <dgm:spPr/>
+    </dgm:pt>
+    <dgm:pt modelId="{47ABDAB3-8F7A-485E-B11A-A1136BE795C9}" type="pres">
+      <dgm:prSet presAssocID="{2999D138-02E1-4A62-85C1-A1728A2A3B07}" presName="space" presStyleCnt="0"/>
+      <dgm:spPr/>
+    </dgm:pt>
+    <dgm:pt modelId="{1F77D1AA-3944-4C50-B87C-0EA0B2159593}" type="pres">
+      <dgm:prSet presAssocID="{71E82913-291C-4747-9E0D-E26FBCCAC453}" presName="compositeB" presStyleCnt="0"/>
+      <dgm:spPr/>
+    </dgm:pt>
+    <dgm:pt modelId="{5807F4F2-0443-4295-97A8-373A86B2C4AF}" type="pres">
+      <dgm:prSet presAssocID="{71E82913-291C-4747-9E0D-E26FBCCAC453}" presName="textB" presStyleLbl="revTx" presStyleIdx="1" presStyleCnt="5" custLinFactY="-50000" custLinFactNeighborX="-1324" custLinFactNeighborY="-100000">
+        <dgm:presLayoutVars>
+          <dgm:bulletEnabled val="1"/>
+        </dgm:presLayoutVars>
+      </dgm:prSet>
+      <dgm:spPr/>
+      <dgm:t>
+        <a:bodyPr/>
+        <a:lstStyle/>
+        <a:p>
+          <a:endParaRPr lang="de-DE"/>
+        </a:p>
+      </dgm:t>
+    </dgm:pt>
     <dgm:pt modelId="{3390B0D5-AE1A-4F2A-BB66-6CE85BAE12B8}" type="pres">
       <dgm:prSet presAssocID="{71E82913-291C-4747-9E0D-E26FBCCAC453}" presName="circleB" presStyleLbl="node1" presStyleIdx="1" presStyleCnt="5"/>
       <dgm:spPr/>
@@ -12960,6 +13290,13 @@
         </dgm:presLayoutVars>
       </dgm:prSet>
       <dgm:spPr/>
+      <dgm:t>
+        <a:bodyPr/>
+        <a:lstStyle/>
+        <a:p>
+          <a:endParaRPr lang="de-DE"/>
+        </a:p>
+      </dgm:t>
     </dgm:pt>
     <dgm:pt modelId="{6127A24A-86B8-4753-A36D-94B3824E5DCE}" type="pres">
       <dgm:prSet presAssocID="{E358C221-9508-4421-8C3E-C14A1766DA97}" presName="circleA" presStyleLbl="node1" presStyleIdx="2" presStyleCnt="5"/>
@@ -12984,6 +13321,13 @@
         </dgm:presLayoutVars>
       </dgm:prSet>
       <dgm:spPr/>
+      <dgm:t>
+        <a:bodyPr/>
+        <a:lstStyle/>
+        <a:p>
+          <a:endParaRPr lang="de-DE"/>
+        </a:p>
+      </dgm:t>
     </dgm:pt>
     <dgm:pt modelId="{EE50FC0A-1800-4B55-A6F5-CD88882CD84D}" type="pres">
       <dgm:prSet presAssocID="{263D1932-C914-44FA-91E5-7404EFB65698}" presName="circleB" presStyleLbl="node1" presStyleIdx="3" presStyleCnt="5"/>
@@ -13008,6 +13352,13 @@
         </dgm:presLayoutVars>
       </dgm:prSet>
       <dgm:spPr/>
+      <dgm:t>
+        <a:bodyPr/>
+        <a:lstStyle/>
+        <a:p>
+          <a:endParaRPr lang="de-DE"/>
+        </a:p>
+      </dgm:t>
     </dgm:pt>
     <dgm:pt modelId="{56D082C5-8BA8-46CA-814D-30BD0AEEB51B}" type="pres">
       <dgm:prSet presAssocID="{863FD00F-879C-40D8-BCA7-9630CC06DBCD}" presName="circleA" presStyleLbl="node1" presStyleIdx="4" presStyleCnt="5"/>
@@ -13358,50 +13709,6 @@
         </dgm:presLayoutVars>
       </dgm:prSet>
       <dgm:spPr/>
-    </dgm:pt>
-    <dgm:pt modelId="{4AB9A1D7-027D-4EA5-B85D-2A0F7127070F}" type="pres">
-      <dgm:prSet presAssocID="{C092B36E-43EF-43DF-B7ED-BB22C399B9C8}" presName="arrow" presStyleLbl="bgShp" presStyleIdx="0" presStyleCnt="1" custScaleX="91490"/>
-      <dgm:spPr/>
-    </dgm:pt>
-    <dgm:pt modelId="{3EBEE75B-F854-49BE-8D44-C587FA288C70}" type="pres">
-      <dgm:prSet presAssocID="{C092B36E-43EF-43DF-B7ED-BB22C399B9C8}" presName="points" presStyleCnt="0"/>
-      <dgm:spPr/>
-    </dgm:pt>
-    <dgm:pt modelId="{266DB7BC-080A-4953-A2FB-855B1140DE5A}" type="pres">
-      <dgm:prSet presAssocID="{836F97C4-3741-4FD9-B961-3F6BCC913225}" presName="compositeA" presStyleCnt="0"/>
-      <dgm:spPr/>
-    </dgm:pt>
-    <dgm:pt modelId="{AFCA00F9-252C-4474-BE2C-CDC264E45F31}" type="pres">
-      <dgm:prSet presAssocID="{836F97C4-3741-4FD9-B961-3F6BCC913225}" presName="textA" presStyleLbl="revTx" presStyleIdx="0" presStyleCnt="5">
-        <dgm:presLayoutVars>
-          <dgm:bulletEnabled val="1"/>
-        </dgm:presLayoutVars>
-      </dgm:prSet>
-      <dgm:spPr/>
-    </dgm:pt>
-    <dgm:pt modelId="{C39E104A-B3E2-4B8C-A982-8C8DED6454EC}" type="pres">
-      <dgm:prSet presAssocID="{836F97C4-3741-4FD9-B961-3F6BCC913225}" presName="circleA" presStyleLbl="node1" presStyleIdx="0" presStyleCnt="5"/>
-      <dgm:spPr/>
-    </dgm:pt>
-    <dgm:pt modelId="{C791E6BA-5654-40CE-921D-1829DAC31EAA}" type="pres">
-      <dgm:prSet presAssocID="{836F97C4-3741-4FD9-B961-3F6BCC913225}" presName="spaceA" presStyleCnt="0"/>
-      <dgm:spPr/>
-    </dgm:pt>
-    <dgm:pt modelId="{47ABDAB3-8F7A-485E-B11A-A1136BE795C9}" type="pres">
-      <dgm:prSet presAssocID="{2999D138-02E1-4A62-85C1-A1728A2A3B07}" presName="space" presStyleCnt="0"/>
-      <dgm:spPr/>
-    </dgm:pt>
-    <dgm:pt modelId="{1F77D1AA-3944-4C50-B87C-0EA0B2159593}" type="pres">
-      <dgm:prSet presAssocID="{71E82913-291C-4747-9E0D-E26FBCCAC453}" presName="compositeB" presStyleCnt="0"/>
-      <dgm:spPr/>
-    </dgm:pt>
-    <dgm:pt modelId="{5807F4F2-0443-4295-97A8-373A86B2C4AF}" type="pres">
-      <dgm:prSet presAssocID="{71E82913-291C-4747-9E0D-E26FBCCAC453}" presName="textB" presStyleLbl="revTx" presStyleIdx="1" presStyleCnt="5" custLinFactY="-50000" custLinFactNeighborX="-1324" custLinFactNeighborY="-100000">
-        <dgm:presLayoutVars>
-          <dgm:bulletEnabled val="1"/>
-        </dgm:presLayoutVars>
-      </dgm:prSet>
-      <dgm:spPr/>
       <dgm:t>
         <a:bodyPr/>
         <a:lstStyle/>
@@ -13410,6 +13717,64 @@
         </a:p>
       </dgm:t>
     </dgm:pt>
+    <dgm:pt modelId="{4AB9A1D7-027D-4EA5-B85D-2A0F7127070F}" type="pres">
+      <dgm:prSet presAssocID="{C092B36E-43EF-43DF-B7ED-BB22C399B9C8}" presName="arrow" presStyleLbl="bgShp" presStyleIdx="0" presStyleCnt="1" custScaleX="91490"/>
+      <dgm:spPr/>
+    </dgm:pt>
+    <dgm:pt modelId="{3EBEE75B-F854-49BE-8D44-C587FA288C70}" type="pres">
+      <dgm:prSet presAssocID="{C092B36E-43EF-43DF-B7ED-BB22C399B9C8}" presName="points" presStyleCnt="0"/>
+      <dgm:spPr/>
+    </dgm:pt>
+    <dgm:pt modelId="{266DB7BC-080A-4953-A2FB-855B1140DE5A}" type="pres">
+      <dgm:prSet presAssocID="{836F97C4-3741-4FD9-B961-3F6BCC913225}" presName="compositeA" presStyleCnt="0"/>
+      <dgm:spPr/>
+    </dgm:pt>
+    <dgm:pt modelId="{AFCA00F9-252C-4474-BE2C-CDC264E45F31}" type="pres">
+      <dgm:prSet presAssocID="{836F97C4-3741-4FD9-B961-3F6BCC913225}" presName="textA" presStyleLbl="revTx" presStyleIdx="0" presStyleCnt="5">
+        <dgm:presLayoutVars>
+          <dgm:bulletEnabled val="1"/>
+        </dgm:presLayoutVars>
+      </dgm:prSet>
+      <dgm:spPr/>
+      <dgm:t>
+        <a:bodyPr/>
+        <a:lstStyle/>
+        <a:p>
+          <a:endParaRPr lang="de-DE"/>
+        </a:p>
+      </dgm:t>
+    </dgm:pt>
+    <dgm:pt modelId="{C39E104A-B3E2-4B8C-A982-8C8DED6454EC}" type="pres">
+      <dgm:prSet presAssocID="{836F97C4-3741-4FD9-B961-3F6BCC913225}" presName="circleA" presStyleLbl="node1" presStyleIdx="0" presStyleCnt="5"/>
+      <dgm:spPr/>
+    </dgm:pt>
+    <dgm:pt modelId="{C791E6BA-5654-40CE-921D-1829DAC31EAA}" type="pres">
+      <dgm:prSet presAssocID="{836F97C4-3741-4FD9-B961-3F6BCC913225}" presName="spaceA" presStyleCnt="0"/>
+      <dgm:spPr/>
+    </dgm:pt>
+    <dgm:pt modelId="{47ABDAB3-8F7A-485E-B11A-A1136BE795C9}" type="pres">
+      <dgm:prSet presAssocID="{2999D138-02E1-4A62-85C1-A1728A2A3B07}" presName="space" presStyleCnt="0"/>
+      <dgm:spPr/>
+    </dgm:pt>
+    <dgm:pt modelId="{1F77D1AA-3944-4C50-B87C-0EA0B2159593}" type="pres">
+      <dgm:prSet presAssocID="{71E82913-291C-4747-9E0D-E26FBCCAC453}" presName="compositeB" presStyleCnt="0"/>
+      <dgm:spPr/>
+    </dgm:pt>
+    <dgm:pt modelId="{5807F4F2-0443-4295-97A8-373A86B2C4AF}" type="pres">
+      <dgm:prSet presAssocID="{71E82913-291C-4747-9E0D-E26FBCCAC453}" presName="textB" presStyleLbl="revTx" presStyleIdx="1" presStyleCnt="5" custLinFactY="-50000" custLinFactNeighborX="-1324" custLinFactNeighborY="-100000">
+        <dgm:presLayoutVars>
+          <dgm:bulletEnabled val="1"/>
+        </dgm:presLayoutVars>
+      </dgm:prSet>
+      <dgm:spPr/>
+      <dgm:t>
+        <a:bodyPr/>
+        <a:lstStyle/>
+        <a:p>
+          <a:endParaRPr lang="de-DE"/>
+        </a:p>
+      </dgm:t>
+    </dgm:pt>
     <dgm:pt modelId="{3390B0D5-AE1A-4F2A-BB66-6CE85BAE12B8}" type="pres">
       <dgm:prSet presAssocID="{71E82913-291C-4747-9E0D-E26FBCCAC453}" presName="circleB" presStyleLbl="node1" presStyleIdx="1" presStyleCnt="5"/>
       <dgm:spPr/>
@@ -13433,6 +13798,13 @@
         </dgm:presLayoutVars>
       </dgm:prSet>
       <dgm:spPr/>
+      <dgm:t>
+        <a:bodyPr/>
+        <a:lstStyle/>
+        <a:p>
+          <a:endParaRPr lang="de-DE"/>
+        </a:p>
+      </dgm:t>
     </dgm:pt>
     <dgm:pt modelId="{6127A24A-86B8-4753-A36D-94B3824E5DCE}" type="pres">
       <dgm:prSet presAssocID="{E358C221-9508-4421-8C3E-C14A1766DA97}" presName="circleA" presStyleLbl="node1" presStyleIdx="2" presStyleCnt="5"/>
@@ -13457,6 +13829,13 @@
         </dgm:presLayoutVars>
       </dgm:prSet>
       <dgm:spPr/>
+      <dgm:t>
+        <a:bodyPr/>
+        <a:lstStyle/>
+        <a:p>
+          <a:endParaRPr lang="de-DE"/>
+        </a:p>
+      </dgm:t>
     </dgm:pt>
     <dgm:pt modelId="{EE50FC0A-1800-4B55-A6F5-CD88882CD84D}" type="pres">
       <dgm:prSet presAssocID="{263D1932-C914-44FA-91E5-7404EFB65698}" presName="circleB" presStyleLbl="node1" presStyleIdx="3" presStyleCnt="5"/>
@@ -13481,6 +13860,13 @@
         </dgm:presLayoutVars>
       </dgm:prSet>
       <dgm:spPr/>
+      <dgm:t>
+        <a:bodyPr/>
+        <a:lstStyle/>
+        <a:p>
+          <a:endParaRPr lang="de-DE"/>
+        </a:p>
+      </dgm:t>
     </dgm:pt>
     <dgm:pt modelId="{56D082C5-8BA8-46CA-814D-30BD0AEEB51B}" type="pres">
       <dgm:prSet presAssocID="{863FD00F-879C-40D8-BCA7-9630CC06DBCD}" presName="circleA" presStyleLbl="node1" presStyleIdx="4" presStyleCnt="5"/>
@@ -42705,11 +43091,7 @@
           <a:p>
             <a:r>
               <a:rPr kumimoji="0" lang="de-DE" dirty="0" smtClean="0"/>
-              <a:t>Titelmasterformat durch Klicken </a:t>
-            </a:r>
-            <a:r>
-              <a:rPr kumimoji="0" lang="de-DE" dirty="0" smtClean="0"/>
-              <a:t>bearbeiten</a:t>
+              <a:t>Titelmasterformat durch Klicken bearbeiten</a:t>
             </a:r>
             <a:endParaRPr kumimoji="0" lang="en-US" dirty="0"/>
           </a:p>
@@ -43299,6 +43681,150 @@
                   <a:schemeClr val="bg1"/>
                 </a:solidFill>
               </a:rPr>
+              <a:t>Projektteam und Verantwortungen</a:t>
+            </a:r>
+            <a:endParaRPr lang="de-DE" sz="4000" dirty="0">
+              <a:solidFill>
+                <a:schemeClr val="bg1"/>
+              </a:solidFill>
+            </a:endParaRPr>
+          </a:p>
+        </p:txBody>
+      </p:sp>
+      <p:sp>
+        <p:nvSpPr>
+          <p:cNvPr id="5" name="Inhaltsplatzhalter 4"/>
+          <p:cNvSpPr>
+            <a:spLocks noGrp="1"/>
+          </p:cNvSpPr>
+          <p:nvPr>
+            <p:ph idx="1"/>
+          </p:nvPr>
+        </p:nvSpPr>
+        <p:spPr/>
+        <p:txBody>
+          <a:bodyPr/>
+          <a:lstStyle/>
+          <a:p>
+            <a:endParaRPr lang="de-DE" dirty="0"/>
+          </a:p>
+        </p:txBody>
+      </p:sp>
+      <p:graphicFrame>
+        <p:nvGraphicFramePr>
+          <p:cNvPr id="6" name="Diagramm 5"/>
+          <p:cNvGraphicFramePr/>
+          <p:nvPr/>
+        </p:nvGraphicFramePr>
+        <p:xfrm>
+          <a:off x="0" y="6165304"/>
+          <a:ext cx="9144000" cy="720080"/>
+        </p:xfrm>
+        <a:graphic>
+          <a:graphicData uri="http://schemas.openxmlformats.org/drawingml/2006/diagram">
+            <dgm:relIds xmlns:dgm="http://schemas.openxmlformats.org/drawingml/2006/diagram" xmlns:r="http://schemas.openxmlformats.org/officeDocument/2006/relationships" r:dm="rId2" r:lo="rId3" r:qs="rId4" r:cs="rId5"/>
+          </a:graphicData>
+        </a:graphic>
+      </p:graphicFrame>
+      <p:sp>
+        <p:nvSpPr>
+          <p:cNvPr id="7" name="Textfeld 6"/>
+          <p:cNvSpPr txBox="1"/>
+          <p:nvPr/>
+        </p:nvSpPr>
+        <p:spPr>
+          <a:xfrm>
+            <a:off x="2555776" y="6597352"/>
+            <a:ext cx="2845011" cy="261610"/>
+          </a:xfrm>
+          <a:prstGeom prst="rect">
+            <a:avLst/>
+          </a:prstGeom>
+          <a:noFill/>
+        </p:spPr>
+        <p:txBody>
+          <a:bodyPr wrap="square" rtlCol="0">
+            <a:spAutoFit/>
+          </a:bodyPr>
+          <a:lstStyle/>
+          <a:p>
+            <a:pPr marL="0" lvl="1"/>
+            <a:r>
+              <a:rPr lang="de-DE" sz="1100" b="1" dirty="0" smtClean="0">
+                <a:solidFill>
+                  <a:schemeClr val="tx2"/>
+                </a:solidFill>
+              </a:rPr>
+              <a:t>a) </a:t>
+            </a:r>
+            <a:r>
+              <a:rPr lang="de-DE" sz="1100" b="1" dirty="0" smtClean="0"/>
+              <a:t>Projektteam und Verantwortungen</a:t>
+            </a:r>
+            <a:endParaRPr lang="de-DE" b="1" dirty="0" smtClean="0"/>
+          </a:p>
+        </p:txBody>
+      </p:sp>
+    </p:spTree>
+  </p:cSld>
+  <p:clrMapOvr>
+    <a:masterClrMapping/>
+  </p:clrMapOvr>
+  <p:timing>
+    <p:tnLst>
+      <p:par>
+        <p:cTn id="1" dur="indefinite" restart="never" nodeType="tmRoot"/>
+      </p:par>
+    </p:tnLst>
+  </p:timing>
+</p:sld>
+</file>
+
+<file path=ppt/slides/slide11.xml><?xml version="1.0" encoding="utf-8"?>
+<p:sld xmlns:a="http://schemas.openxmlformats.org/drawingml/2006/main" xmlns:r="http://schemas.openxmlformats.org/officeDocument/2006/relationships" xmlns:p="http://schemas.openxmlformats.org/presentationml/2006/main">
+  <p:cSld>
+    <p:spTree>
+      <p:nvGrpSpPr>
+        <p:cNvPr id="1" name=""/>
+        <p:cNvGrpSpPr/>
+        <p:nvPr/>
+      </p:nvGrpSpPr>
+      <p:grpSpPr>
+        <a:xfrm>
+          <a:off x="0" y="0"/>
+          <a:ext cx="0" cy="0"/>
+          <a:chOff x="0" y="0"/>
+          <a:chExt cx="0" cy="0"/>
+        </a:xfrm>
+      </p:grpSpPr>
+      <p:sp>
+        <p:nvSpPr>
+          <p:cNvPr id="2" name="Titel 1"/>
+          <p:cNvSpPr>
+            <a:spLocks noGrp="1"/>
+          </p:cNvSpPr>
+          <p:nvPr>
+            <p:ph type="title"/>
+          </p:nvPr>
+        </p:nvSpPr>
+        <p:spPr/>
+        <p:txBody>
+          <a:bodyPr>
+            <a:normAutofit/>
+          </a:bodyPr>
+          <a:lstStyle/>
+          <a:p>
+            <a:pPr lvl="1" algn="l" rtl="0">
+              <a:spcBef>
+                <a:spcPct val="0"/>
+              </a:spcBef>
+            </a:pPr>
+            <a:r>
+              <a:rPr lang="de-DE" sz="4000" dirty="0" smtClean="0">
+                <a:solidFill>
+                  <a:schemeClr val="bg1"/>
+                </a:solidFill>
+              </a:rPr>
               <a:t>Langzeitplanung</a:t>
             </a:r>
             <a:endParaRPr lang="de-DE" sz="4000" dirty="0">
@@ -43398,7 +43924,7 @@
 </p:sld>
 </file>
 
-<file path=ppt/slides/slide11.xml><?xml version="1.0" encoding="utf-8"?>
+<file path=ppt/slides/slide12.xml><?xml version="1.0" encoding="utf-8"?>
 <p:sld xmlns:a="http://schemas.openxmlformats.org/drawingml/2006/main" xmlns:r="http://schemas.openxmlformats.org/officeDocument/2006/relationships" xmlns:p="http://schemas.openxmlformats.org/presentationml/2006/main">
   <p:cSld>
     <p:spTree>
@@ -43542,7 +44068,7 @@
 </p:sld>
 </file>
 
-<file path=ppt/slides/slide12.xml><?xml version="1.0" encoding="utf-8"?>
+<file path=ppt/slides/slide13.xml><?xml version="1.0" encoding="utf-8"?>
 <p:sld xmlns:a="http://schemas.openxmlformats.org/drawingml/2006/main" xmlns:r="http://schemas.openxmlformats.org/officeDocument/2006/relationships" xmlns:p="http://schemas.openxmlformats.org/presentationml/2006/main">
   <p:cSld>
     <p:spTree>
@@ -43632,7 +44158,7 @@
 </p:sld>
 </file>
 
-<file path=ppt/slides/slide13.xml><?xml version="1.0" encoding="utf-8"?>
+<file path=ppt/slides/slide14.xml><?xml version="1.0" encoding="utf-8"?>
 <p:sld xmlns:a="http://schemas.openxmlformats.org/drawingml/2006/main" xmlns:r="http://schemas.openxmlformats.org/officeDocument/2006/relationships" xmlns:p="http://schemas.openxmlformats.org/presentationml/2006/main">
   <p:cSld>
     <p:spTree>
@@ -43722,7 +44248,7 @@
 </p:sld>
 </file>
 
-<file path=ppt/slides/slide14.xml><?xml version="1.0" encoding="utf-8"?>
+<file path=ppt/slides/slide15.xml><?xml version="1.0" encoding="utf-8"?>
 <p:sld xmlns:a="http://schemas.openxmlformats.org/drawingml/2006/main" xmlns:r="http://schemas.openxmlformats.org/officeDocument/2006/relationships" xmlns:p="http://schemas.openxmlformats.org/presentationml/2006/main">
   <p:cSld>
     <p:spTree>
@@ -43898,25 +44424,8 @@
                   </a:schemeClr>
                 </a:solidFill>
               </a:rPr>
-              <a:t>Aufgabenstellung / </a:t>
+              <a:t>Aufgabenstellung / Vision			Bryan</a:t>
             </a:r>
-            <a:r>
-              <a:rPr lang="de-DE" dirty="0" smtClean="0">
-                <a:solidFill>
-                  <a:schemeClr val="accent3">
-                    <a:lumMod val="50000"/>
-                  </a:schemeClr>
-                </a:solidFill>
-              </a:rPr>
-              <a:t>Vision			Bryan</a:t>
-            </a:r>
-            <a:endParaRPr lang="de-DE" dirty="0" smtClean="0">
-              <a:solidFill>
-                <a:schemeClr val="accent3">
-                  <a:lumMod val="50000"/>
-                </a:schemeClr>
-              </a:solidFill>
-            </a:endParaRPr>
           </a:p>
           <a:p>
             <a:pPr lvl="1"/>
@@ -43928,17 +44437,7 @@
                   </a:schemeClr>
                 </a:solidFill>
               </a:rPr>
-              <a:t>Anforderungen und </a:t>
-            </a:r>
-            <a:r>
-              <a:rPr lang="de-DE" dirty="0" smtClean="0">
-                <a:solidFill>
-                  <a:schemeClr val="accent3">
-                    <a:lumMod val="50000"/>
-                  </a:schemeClr>
-                </a:solidFill>
-              </a:rPr>
-              <a:t>Rahmenbedingungen	</a:t>
+              <a:t>Anforderungen und Rahmenbedingungen	</a:t>
             </a:r>
             <a:r>
               <a:rPr lang="de-DE" dirty="0" err="1" smtClean="0">
@@ -43980,17 +44479,7 @@
                   </a:schemeClr>
                 </a:solidFill>
               </a:rPr>
-              <a:t>Projektteam und </a:t>
-            </a:r>
-            <a:r>
-              <a:rPr lang="de-DE" dirty="0" smtClean="0">
-                <a:solidFill>
-                  <a:schemeClr val="accent3">
-                    <a:lumMod val="50000"/>
-                  </a:schemeClr>
-                </a:solidFill>
-              </a:rPr>
-              <a:t>Verantwortungen		</a:t>
+              <a:t>Projektteam und Verantwortungen		</a:t>
             </a:r>
             <a:r>
               <a:rPr lang="de-DE" dirty="0" err="1" smtClean="0">
@@ -44081,13 +44570,6 @@
               </a:rPr>
               <a:t>Konfiguration			</a:t>
             </a:r>
-            <a:endParaRPr lang="de-DE" dirty="0" smtClean="0">
-              <a:solidFill>
-                <a:schemeClr val="accent3">
-                  <a:lumMod val="50000"/>
-                </a:schemeClr>
-              </a:solidFill>
-            </a:endParaRPr>
           </a:p>
           <a:p>
             <a:pPr lvl="1"/>
@@ -44111,13 +44593,6 @@
               </a:rPr>
               <a:t>				Bryan</a:t>
             </a:r>
-            <a:endParaRPr lang="de-DE" dirty="0" smtClean="0">
-              <a:solidFill>
-                <a:schemeClr val="accent3">
-                  <a:lumMod val="50000"/>
-                </a:schemeClr>
-              </a:solidFill>
-            </a:endParaRPr>
           </a:p>
           <a:p>
             <a:pPr lvl="1"/>
@@ -44152,6 +44627,26 @@
           <a:p>
             <a:pPr lvl="2"/>
             <a:r>
+              <a:rPr lang="de-DE" dirty="0" err="1" smtClean="0">
+                <a:solidFill>
+                  <a:schemeClr val="accent3">
+                    <a:lumMod val="50000"/>
+                  </a:schemeClr>
+                </a:solidFill>
+              </a:rPr>
+              <a:t>Unittest</a:t>
+            </a:r>
+            <a:endParaRPr lang="de-DE" dirty="0" smtClean="0">
+              <a:solidFill>
+                <a:schemeClr val="accent3">
+                  <a:lumMod val="50000"/>
+                </a:schemeClr>
+              </a:solidFill>
+            </a:endParaRPr>
+          </a:p>
+          <a:p>
+            <a:pPr lvl="2"/>
+            <a:r>
               <a:rPr lang="de-DE" dirty="0" smtClean="0">
                 <a:solidFill>
                   <a:schemeClr val="accent3">
@@ -44160,19 +44655,6 @@
                 </a:solidFill>
               </a:rPr>
               <a:t>UI-Test</a:t>
-            </a:r>
-          </a:p>
-          <a:p>
-            <a:pPr lvl="2"/>
-            <a:r>
-              <a:rPr lang="de-DE" dirty="0" err="1" smtClean="0">
-                <a:solidFill>
-                  <a:schemeClr val="accent3">
-                    <a:lumMod val="50000"/>
-                  </a:schemeClr>
-                </a:solidFill>
-              </a:rPr>
-              <a:t>Unittest</a:t>
             </a:r>
             <a:endParaRPr lang="de-DE" dirty="0" smtClean="0">
               <a:solidFill>
@@ -44293,13 +44775,6 @@
               </a:rPr>
               <a:t>/Bryan</a:t>
             </a:r>
-            <a:endParaRPr lang="de-DE" dirty="0" smtClean="0">
-              <a:solidFill>
-                <a:schemeClr val="accent3">
-                  <a:lumMod val="50000"/>
-                </a:schemeClr>
-              </a:solidFill>
-            </a:endParaRPr>
           </a:p>
           <a:p>
             <a:pPr marL="438912" lvl="1" indent="-320040">
@@ -44321,25 +44796,8 @@
                   </a:schemeClr>
                 </a:solidFill>
               </a:rPr>
-              <a:t>Fazit und </a:t>
+              <a:t>Fazit und weiteres Vorgehen			Bryan</a:t>
             </a:r>
-            <a:r>
-              <a:rPr lang="de-DE" dirty="0" smtClean="0">
-                <a:solidFill>
-                  <a:schemeClr val="accent3">
-                    <a:lumMod val="50000"/>
-                  </a:schemeClr>
-                </a:solidFill>
-              </a:rPr>
-              <a:t>weiteres Vorgehen			Bryan</a:t>
-            </a:r>
-            <a:endParaRPr lang="de-DE" dirty="0" smtClean="0">
-              <a:solidFill>
-                <a:schemeClr val="accent3">
-                  <a:lumMod val="50000"/>
-                </a:schemeClr>
-              </a:solidFill>
-            </a:endParaRPr>
           </a:p>
           <a:p>
             <a:endParaRPr lang="de-DE" dirty="0">
@@ -44453,13 +44911,8 @@
             <a:pPr lvl="1"/>
             <a:r>
               <a:rPr lang="de-DE" dirty="0" smtClean="0"/>
-              <a:t>Projektteam und </a:t>
+              <a:t>Projektteam und Verantwortungen</a:t>
             </a:r>
-            <a:r>
-              <a:rPr lang="de-DE" dirty="0" smtClean="0"/>
-              <a:t>Verantwortungen</a:t>
-            </a:r>
-            <a:endParaRPr lang="de-DE" dirty="0" smtClean="0"/>
           </a:p>
           <a:p>
             <a:pPr lvl="1"/>
@@ -44559,15 +45012,7 @@
             </a:pPr>
             <a:r>
               <a:rPr lang="de-DE" dirty="0" smtClean="0"/>
-              <a:t>Fazit und </a:t>
-            </a:r>
-            <a:r>
-              <a:rPr lang="de-DE" dirty="0" smtClean="0"/>
-              <a:t>weiteres </a:t>
-            </a:r>
-            <a:r>
-              <a:rPr lang="de-DE" dirty="0" smtClean="0"/>
-              <a:t>Vorgehen</a:t>
+              <a:t>Fazit und weiteres Vorgehen</a:t>
             </a:r>
           </a:p>
           <a:p>
@@ -44783,15 +45228,7 @@
                   <a:schemeClr val="tx2"/>
                 </a:solidFill>
               </a:rPr>
-              <a:t>a) </a:t>
-            </a:r>
-            <a:r>
-              <a:rPr lang="de-DE" sz="1100" b="1" dirty="0" smtClean="0">
-                <a:solidFill>
-                  <a:schemeClr val="tx2"/>
-                </a:solidFill>
-              </a:rPr>
-              <a:t>Aufgabenstellung / Vision</a:t>
+              <a:t>a) Aufgabenstellung / Vision</a:t>
             </a:r>
             <a:endParaRPr lang="de-DE" sz="1100" b="1" dirty="0">
               <a:solidFill>
@@ -44852,7 +45289,293 @@
           <a:p>
             <a:r>
               <a:rPr lang="de-DE" dirty="0" smtClean="0"/>
-              <a:t>Anforderungen</a:t>
+              <a:t>Funktionelle Anforderungen</a:t>
+            </a:r>
+            <a:endParaRPr lang="de-DE" dirty="0"/>
+          </a:p>
+        </p:txBody>
+      </p:sp>
+      <p:pic>
+        <p:nvPicPr>
+          <p:cNvPr id="9218" name="Picture 2" descr="https://raw.githubusercontent.com/SAS-Systems/Unveiled-Documentation/master/Bilder/UC_Diagrams/Unveiled_Overall%20Use%20Case%20Diagram.png"/>
+          <p:cNvPicPr>
+            <a:picLocks noChangeAspect="1" noChangeArrowheads="1"/>
+          </p:cNvPicPr>
+          <p:nvPr/>
+        </p:nvPicPr>
+        <p:blipFill>
+          <a:blip r:embed="rId2" cstate="print"/>
+          <a:srcRect/>
+          <a:stretch>
+            <a:fillRect/>
+          </a:stretch>
+        </p:blipFill>
+        <p:spPr bwMode="auto">
+          <a:xfrm>
+            <a:off x="683568" y="1110582"/>
+            <a:ext cx="7884368" cy="5747418"/>
+          </a:xfrm>
+          <a:prstGeom prst="rect">
+            <a:avLst/>
+          </a:prstGeom>
+          <a:noFill/>
+        </p:spPr>
+      </p:pic>
+    </p:spTree>
+  </p:cSld>
+  <p:clrMapOvr>
+    <a:masterClrMapping/>
+  </p:clrMapOvr>
+  <p:timing>
+    <p:tnLst>
+      <p:par>
+        <p:cTn id="1" dur="indefinite" restart="never" nodeType="tmRoot"/>
+      </p:par>
+    </p:tnLst>
+  </p:timing>
+</p:sld>
+</file>
+
+<file path=ppt/slides/slide7.xml><?xml version="1.0" encoding="utf-8"?>
+<p:sld xmlns:a="http://schemas.openxmlformats.org/drawingml/2006/main" xmlns:r="http://schemas.openxmlformats.org/officeDocument/2006/relationships" xmlns:p="http://schemas.openxmlformats.org/presentationml/2006/main">
+  <p:cSld>
+    <p:spTree>
+      <p:nvGrpSpPr>
+        <p:cNvPr id="1" name=""/>
+        <p:cNvGrpSpPr/>
+        <p:nvPr/>
+      </p:nvGrpSpPr>
+      <p:grpSpPr>
+        <a:xfrm>
+          <a:off x="0" y="0"/>
+          <a:ext cx="0" cy="0"/>
+          <a:chOff x="0" y="0"/>
+          <a:chExt cx="0" cy="0"/>
+        </a:xfrm>
+      </p:grpSpPr>
+      <p:sp>
+        <p:nvSpPr>
+          <p:cNvPr id="2" name="Titel 1"/>
+          <p:cNvSpPr>
+            <a:spLocks noGrp="1"/>
+          </p:cNvSpPr>
+          <p:nvPr>
+            <p:ph type="title"/>
+          </p:nvPr>
+        </p:nvSpPr>
+        <p:spPr/>
+        <p:txBody>
+          <a:bodyPr>
+            <a:normAutofit/>
+          </a:bodyPr>
+          <a:lstStyle/>
+          <a:p>
+            <a:r>
+              <a:rPr lang="de-DE" dirty="0" smtClean="0"/>
+              <a:t>Nicht-funktionelle Anforderungen</a:t>
+            </a:r>
+            <a:endParaRPr lang="de-DE" dirty="0"/>
+          </a:p>
+        </p:txBody>
+      </p:sp>
+      <p:sp>
+        <p:nvSpPr>
+          <p:cNvPr id="5" name="Inhaltsplatzhalter 4"/>
+          <p:cNvSpPr>
+            <a:spLocks noGrp="1"/>
+          </p:cNvSpPr>
+          <p:nvPr>
+            <p:ph idx="1"/>
+          </p:nvPr>
+        </p:nvSpPr>
+        <p:spPr/>
+        <p:txBody>
+          <a:bodyPr>
+            <a:normAutofit lnSpcReduction="10000"/>
+          </a:bodyPr>
+          <a:lstStyle/>
+          <a:p>
+            <a:r>
+              <a:rPr lang="de-DE" dirty="0" err="1" smtClean="0"/>
+              <a:t>Bedienbarkeit</a:t>
+            </a:r>
+            <a:endParaRPr lang="de-DE" dirty="0" smtClean="0"/>
+          </a:p>
+          <a:p>
+            <a:pPr lvl="1"/>
+            <a:r>
+              <a:rPr lang="de-DE" dirty="0" err="1" smtClean="0"/>
+              <a:t>Android</a:t>
+            </a:r>
+            <a:r>
+              <a:rPr lang="de-DE" dirty="0" smtClean="0"/>
+              <a:t> Smartphone</a:t>
+            </a:r>
+          </a:p>
+          <a:p>
+            <a:pPr lvl="1"/>
+            <a:r>
+              <a:rPr lang="de-DE" dirty="0" smtClean="0"/>
+              <a:t>Aktueller Browser</a:t>
+            </a:r>
+          </a:p>
+          <a:p>
+            <a:pPr lvl="1"/>
+            <a:r>
+              <a:rPr lang="de-DE" dirty="0" smtClean="0"/>
+              <a:t>Ehrliche Person</a:t>
+            </a:r>
+          </a:p>
+          <a:p>
+            <a:r>
+              <a:rPr lang="de-DE" dirty="0" smtClean="0"/>
+              <a:t>Zuverlässigkeit</a:t>
+            </a:r>
+          </a:p>
+          <a:p>
+            <a:pPr lvl="1"/>
+            <a:r>
+              <a:rPr lang="de-DE" dirty="0" smtClean="0"/>
+              <a:t>Serververfügbarkeit</a:t>
+            </a:r>
+          </a:p>
+          <a:p>
+            <a:pPr lvl="1"/>
+            <a:r>
+              <a:rPr lang="de-DE" dirty="0" smtClean="0"/>
+              <a:t>RFC-Konformität</a:t>
+            </a:r>
+          </a:p>
+          <a:p>
+            <a:r>
+              <a:rPr lang="de-DE" dirty="0" err="1" smtClean="0"/>
+              <a:t>Wartbarkeit</a:t>
+            </a:r>
+            <a:endParaRPr lang="de-DE" dirty="0" smtClean="0"/>
+          </a:p>
+          <a:p>
+            <a:pPr lvl="1"/>
+            <a:r>
+              <a:rPr lang="de-DE" dirty="0" smtClean="0"/>
+              <a:t>Genutzte Sprachen</a:t>
+            </a:r>
+          </a:p>
+          <a:p>
+            <a:pPr lvl="1"/>
+            <a:r>
+              <a:rPr lang="de-DE" dirty="0" smtClean="0"/>
+              <a:t>Abhängigkeiten</a:t>
+            </a:r>
+            <a:endParaRPr lang="de-DE" dirty="0"/>
+          </a:p>
+        </p:txBody>
+      </p:sp>
+      <p:graphicFrame>
+        <p:nvGraphicFramePr>
+          <p:cNvPr id="6" name="Diagramm 5"/>
+          <p:cNvGraphicFramePr/>
+          <p:nvPr/>
+        </p:nvGraphicFramePr>
+        <p:xfrm>
+          <a:off x="0" y="6165304"/>
+          <a:ext cx="9144000" cy="720080"/>
+        </p:xfrm>
+        <a:graphic>
+          <a:graphicData uri="http://schemas.openxmlformats.org/drawingml/2006/diagram">
+            <dgm:relIds xmlns:dgm="http://schemas.openxmlformats.org/drawingml/2006/diagram" xmlns:r="http://schemas.openxmlformats.org/officeDocument/2006/relationships" r:dm="rId2" r:lo="rId3" r:qs="rId4" r:cs="rId5"/>
+          </a:graphicData>
+        </a:graphic>
+      </p:graphicFrame>
+      <p:sp>
+        <p:nvSpPr>
+          <p:cNvPr id="7" name="Textfeld 6"/>
+          <p:cNvSpPr txBox="1"/>
+          <p:nvPr/>
+        </p:nvSpPr>
+        <p:spPr>
+          <a:xfrm>
+            <a:off x="862893" y="6597352"/>
+            <a:ext cx="2845011" cy="261610"/>
+          </a:xfrm>
+          <a:prstGeom prst="rect">
+            <a:avLst/>
+          </a:prstGeom>
+          <a:noFill/>
+        </p:spPr>
+        <p:txBody>
+          <a:bodyPr wrap="square" rtlCol="0">
+            <a:spAutoFit/>
+          </a:bodyPr>
+          <a:lstStyle/>
+          <a:p>
+            <a:r>
+              <a:rPr lang="de-DE" sz="1100" b="1" dirty="0" smtClean="0">
+                <a:solidFill>
+                  <a:schemeClr val="tx2"/>
+                </a:solidFill>
+              </a:rPr>
+              <a:t>a) Anforderungen und Rahmenbedingungen</a:t>
+            </a:r>
+            <a:endParaRPr lang="de-DE" sz="1100" b="1" dirty="0">
+              <a:solidFill>
+                <a:schemeClr val="tx2"/>
+              </a:solidFill>
+            </a:endParaRPr>
+          </a:p>
+        </p:txBody>
+      </p:sp>
+    </p:spTree>
+  </p:cSld>
+  <p:clrMapOvr>
+    <a:masterClrMapping/>
+  </p:clrMapOvr>
+  <p:timing>
+    <p:tnLst>
+      <p:par>
+        <p:cTn id="1" dur="indefinite" restart="never" nodeType="tmRoot"/>
+      </p:par>
+    </p:tnLst>
+  </p:timing>
+</p:sld>
+</file>
+
+<file path=ppt/slides/slide8.xml><?xml version="1.0" encoding="utf-8"?>
+<p:sld xmlns:a="http://schemas.openxmlformats.org/drawingml/2006/main" xmlns:r="http://schemas.openxmlformats.org/officeDocument/2006/relationships" xmlns:p="http://schemas.openxmlformats.org/presentationml/2006/main">
+  <p:cSld>
+    <p:spTree>
+      <p:nvGrpSpPr>
+        <p:cNvPr id="1" name=""/>
+        <p:cNvGrpSpPr/>
+        <p:nvPr/>
+      </p:nvGrpSpPr>
+      <p:grpSpPr>
+        <a:xfrm>
+          <a:off x="0" y="0"/>
+          <a:ext cx="0" cy="0"/>
+          <a:chOff x="0" y="0"/>
+          <a:chExt cx="0" cy="0"/>
+        </a:xfrm>
+      </p:grpSpPr>
+      <p:sp>
+        <p:nvSpPr>
+          <p:cNvPr id="2" name="Titel 1"/>
+          <p:cNvSpPr>
+            <a:spLocks noGrp="1"/>
+          </p:cNvSpPr>
+          <p:nvPr>
+            <p:ph type="title"/>
+          </p:nvPr>
+        </p:nvSpPr>
+        <p:spPr/>
+        <p:txBody>
+          <a:bodyPr>
+            <a:normAutofit/>
+          </a:bodyPr>
+          <a:lstStyle/>
+          <a:p>
+            <a:r>
+              <a:rPr lang="de-DE" dirty="0" smtClean="0"/>
+              <a:t>Rahmenbedingungen</a:t>
             </a:r>
             <a:endParaRPr lang="de-DE" dirty="0"/>
           </a:p>
@@ -44873,6 +45596,43 @@
           <a:bodyPr/>
           <a:lstStyle/>
           <a:p>
+            <a:r>
+              <a:rPr lang="de-DE" dirty="0" smtClean="0"/>
+              <a:t>Nicht Teil dieses Projekts:</a:t>
+            </a:r>
+          </a:p>
+          <a:p>
+            <a:pPr lvl="1"/>
+            <a:r>
+              <a:rPr lang="de-DE" dirty="0" smtClean="0"/>
+              <a:t>Publikation des Inhalts </a:t>
+            </a:r>
+            <a:r>
+              <a:rPr lang="de-DE" dirty="0" smtClean="0"/>
+              <a:t>(z. B. über soziale Netzwerke</a:t>
+            </a:r>
+            <a:r>
+              <a:rPr lang="de-DE" dirty="0" smtClean="0"/>
+              <a:t>) oder </a:t>
+            </a:r>
+            <a:r>
+              <a:rPr lang="de-DE" dirty="0" smtClean="0"/>
+              <a:t>Entwicklung einer </a:t>
+            </a:r>
+            <a:r>
+              <a:rPr lang="de-DE" dirty="0" smtClean="0"/>
+              <a:t>dafür zuständigen API</a:t>
+            </a:r>
+          </a:p>
+          <a:p>
+            <a:pPr lvl="1"/>
+            <a:r>
+              <a:rPr lang="de-DE" dirty="0" smtClean="0"/>
+              <a:t>Öfftl. Bereitstellung eines Streaming-Servers</a:t>
+            </a:r>
+          </a:p>
+          <a:p>
+            <a:pPr lvl="1"/>
             <a:endParaRPr lang="de-DE" dirty="0"/>
           </a:p>
         </p:txBody>
@@ -44929,7 +45689,15 @@
                   <a:schemeClr val="tx2"/>
                 </a:solidFill>
               </a:rPr>
-              <a:t>Anforderungen und Rahmenbedingungen</a:t>
+              <a:t>Anforderungen und </a:t>
+            </a:r>
+            <a:r>
+              <a:rPr lang="de-DE" sz="1100" b="1" dirty="0" smtClean="0">
+                <a:solidFill>
+                  <a:schemeClr val="tx2"/>
+                </a:solidFill>
+              </a:rPr>
+              <a:t>Rahmenbedingungen</a:t>
             </a:r>
             <a:endParaRPr lang="de-DE" sz="1100" b="1" dirty="0">
               <a:solidFill>
@@ -44954,145 +45722,7 @@
 </p:sld>
 </file>
 
-<file path=ppt/slides/slide7.xml><?xml version="1.0" encoding="utf-8"?>
-<p:sld xmlns:a="http://schemas.openxmlformats.org/drawingml/2006/main" xmlns:r="http://schemas.openxmlformats.org/officeDocument/2006/relationships" xmlns:p="http://schemas.openxmlformats.org/presentationml/2006/main">
-  <p:cSld>
-    <p:spTree>
-      <p:nvGrpSpPr>
-        <p:cNvPr id="1" name=""/>
-        <p:cNvGrpSpPr/>
-        <p:nvPr/>
-      </p:nvGrpSpPr>
-      <p:grpSpPr>
-        <a:xfrm>
-          <a:off x="0" y="0"/>
-          <a:ext cx="0" cy="0"/>
-          <a:chOff x="0" y="0"/>
-          <a:chExt cx="0" cy="0"/>
-        </a:xfrm>
-      </p:grpSpPr>
-      <p:sp>
-        <p:nvSpPr>
-          <p:cNvPr id="2" name="Titel 1"/>
-          <p:cNvSpPr>
-            <a:spLocks noGrp="1"/>
-          </p:cNvSpPr>
-          <p:nvPr>
-            <p:ph type="title"/>
-          </p:nvPr>
-        </p:nvSpPr>
-        <p:spPr/>
-        <p:txBody>
-          <a:bodyPr>
-            <a:normAutofit/>
-          </a:bodyPr>
-          <a:lstStyle/>
-          <a:p>
-            <a:r>
-              <a:rPr lang="de-DE" dirty="0" smtClean="0"/>
-              <a:t>Rahmenbedingungen</a:t>
-            </a:r>
-            <a:endParaRPr lang="de-DE" dirty="0"/>
-          </a:p>
-        </p:txBody>
-      </p:sp>
-      <p:sp>
-        <p:nvSpPr>
-          <p:cNvPr id="5" name="Inhaltsplatzhalter 4"/>
-          <p:cNvSpPr>
-            <a:spLocks noGrp="1"/>
-          </p:cNvSpPr>
-          <p:nvPr>
-            <p:ph idx="1"/>
-          </p:nvPr>
-        </p:nvSpPr>
-        <p:spPr/>
-        <p:txBody>
-          <a:bodyPr/>
-          <a:lstStyle/>
-          <a:p>
-            <a:endParaRPr lang="de-DE" dirty="0"/>
-          </a:p>
-        </p:txBody>
-      </p:sp>
-      <p:graphicFrame>
-        <p:nvGraphicFramePr>
-          <p:cNvPr id="6" name="Diagramm 5"/>
-          <p:cNvGraphicFramePr/>
-          <p:nvPr/>
-        </p:nvGraphicFramePr>
-        <p:xfrm>
-          <a:off x="0" y="6165304"/>
-          <a:ext cx="9144000" cy="720080"/>
-        </p:xfrm>
-        <a:graphic>
-          <a:graphicData uri="http://schemas.openxmlformats.org/drawingml/2006/diagram">
-            <dgm:relIds xmlns:dgm="http://schemas.openxmlformats.org/drawingml/2006/diagram" xmlns:r="http://schemas.openxmlformats.org/officeDocument/2006/relationships" r:dm="rId2" r:lo="rId3" r:qs="rId4" r:cs="rId5"/>
-          </a:graphicData>
-        </a:graphic>
-      </p:graphicFrame>
-      <p:sp>
-        <p:nvSpPr>
-          <p:cNvPr id="7" name="Textfeld 6"/>
-          <p:cNvSpPr txBox="1"/>
-          <p:nvPr/>
-        </p:nvSpPr>
-        <p:spPr>
-          <a:xfrm>
-            <a:off x="862893" y="6597352"/>
-            <a:ext cx="2845011" cy="261610"/>
-          </a:xfrm>
-          <a:prstGeom prst="rect">
-            <a:avLst/>
-          </a:prstGeom>
-          <a:noFill/>
-        </p:spPr>
-        <p:txBody>
-          <a:bodyPr wrap="square" rtlCol="0">
-            <a:spAutoFit/>
-          </a:bodyPr>
-          <a:lstStyle/>
-          <a:p>
-            <a:r>
-              <a:rPr lang="de-DE" sz="1100" b="1" dirty="0" smtClean="0">
-                <a:solidFill>
-                  <a:schemeClr val="tx2"/>
-                </a:solidFill>
-              </a:rPr>
-              <a:t>a) </a:t>
-            </a:r>
-            <a:r>
-              <a:rPr lang="de-DE" sz="1100" b="1" dirty="0" smtClean="0">
-                <a:solidFill>
-                  <a:schemeClr val="tx2"/>
-                </a:solidFill>
-              </a:rPr>
-              <a:t>Anforderungen und Rahmenbedingungen</a:t>
-            </a:r>
-            <a:endParaRPr lang="de-DE" sz="1100" b="1" dirty="0">
-              <a:solidFill>
-                <a:schemeClr val="tx2"/>
-              </a:solidFill>
-            </a:endParaRPr>
-          </a:p>
-        </p:txBody>
-      </p:sp>
-    </p:spTree>
-  </p:cSld>
-  <p:clrMapOvr>
-    <a:masterClrMapping/>
-  </p:clrMapOvr>
-  <p:timing>
-    <p:tnLst>
-      <p:par>
-        <p:cTn id="1" dur="indefinite" restart="never" nodeType="tmRoot"/>
-      </p:par>
-    </p:tnLst>
-  </p:timing>
-</p:sld>
-</file>
-
-<file path=ppt/slides/slide8.xml><?xml version="1.0" encoding="utf-8"?>
+<file path=ppt/slides/slide9.xml><?xml version="1.0" encoding="utf-8"?>
 <p:sld xmlns:a="http://schemas.openxmlformats.org/drawingml/2006/main" xmlns:r="http://schemas.openxmlformats.org/officeDocument/2006/relationships" xmlns:p="http://schemas.openxmlformats.org/presentationml/2006/main">
   <p:cSld>
     <p:spTree>
@@ -45167,154 +45797,6 @@
           </a:graphicData>
         </a:graphic>
       </p:graphicFrame>
-    </p:spTree>
-  </p:cSld>
-  <p:clrMapOvr>
-    <a:masterClrMapping/>
-  </p:clrMapOvr>
-  <p:timing>
-    <p:tnLst>
-      <p:par>
-        <p:cTn id="1" dur="indefinite" restart="never" nodeType="tmRoot"/>
-      </p:par>
-    </p:tnLst>
-  </p:timing>
-</p:sld>
-</file>
-
-<file path=ppt/slides/slide9.xml><?xml version="1.0" encoding="utf-8"?>
-<p:sld xmlns:a="http://schemas.openxmlformats.org/drawingml/2006/main" xmlns:r="http://schemas.openxmlformats.org/officeDocument/2006/relationships" xmlns:p="http://schemas.openxmlformats.org/presentationml/2006/main">
-  <p:cSld>
-    <p:spTree>
-      <p:nvGrpSpPr>
-        <p:cNvPr id="1" name=""/>
-        <p:cNvGrpSpPr/>
-        <p:nvPr/>
-      </p:nvGrpSpPr>
-      <p:grpSpPr>
-        <a:xfrm>
-          <a:off x="0" y="0"/>
-          <a:ext cx="0" cy="0"/>
-          <a:chOff x="0" y="0"/>
-          <a:chExt cx="0" cy="0"/>
-        </a:xfrm>
-      </p:grpSpPr>
-      <p:sp>
-        <p:nvSpPr>
-          <p:cNvPr id="2" name="Titel 1"/>
-          <p:cNvSpPr>
-            <a:spLocks noGrp="1"/>
-          </p:cNvSpPr>
-          <p:nvPr>
-            <p:ph type="title"/>
-          </p:nvPr>
-        </p:nvSpPr>
-        <p:spPr/>
-        <p:txBody>
-          <a:bodyPr>
-            <a:normAutofit/>
-          </a:bodyPr>
-          <a:lstStyle/>
-          <a:p>
-            <a:pPr lvl="1" algn="l" rtl="0">
-              <a:spcBef>
-                <a:spcPct val="0"/>
-              </a:spcBef>
-            </a:pPr>
-            <a:r>
-              <a:rPr lang="de-DE" sz="4000" dirty="0" smtClean="0">
-                <a:solidFill>
-                  <a:schemeClr val="bg1"/>
-                </a:solidFill>
-              </a:rPr>
-              <a:t>Projektteam und Verantwortungen</a:t>
-            </a:r>
-            <a:endParaRPr lang="de-DE" sz="4000" dirty="0">
-              <a:solidFill>
-                <a:schemeClr val="bg1"/>
-              </a:solidFill>
-            </a:endParaRPr>
-          </a:p>
-        </p:txBody>
-      </p:sp>
-      <p:sp>
-        <p:nvSpPr>
-          <p:cNvPr id="5" name="Inhaltsplatzhalter 4"/>
-          <p:cNvSpPr>
-            <a:spLocks noGrp="1"/>
-          </p:cNvSpPr>
-          <p:nvPr>
-            <p:ph idx="1"/>
-          </p:nvPr>
-        </p:nvSpPr>
-        <p:spPr/>
-        <p:txBody>
-          <a:bodyPr/>
-          <a:lstStyle/>
-          <a:p>
-            <a:endParaRPr lang="de-DE" dirty="0"/>
-          </a:p>
-        </p:txBody>
-      </p:sp>
-      <p:graphicFrame>
-        <p:nvGraphicFramePr>
-          <p:cNvPr id="6" name="Diagramm 5"/>
-          <p:cNvGraphicFramePr/>
-          <p:nvPr/>
-        </p:nvGraphicFramePr>
-        <p:xfrm>
-          <a:off x="0" y="6165304"/>
-          <a:ext cx="9144000" cy="720080"/>
-        </p:xfrm>
-        <a:graphic>
-          <a:graphicData uri="http://schemas.openxmlformats.org/drawingml/2006/diagram">
-            <dgm:relIds xmlns:dgm="http://schemas.openxmlformats.org/drawingml/2006/diagram" xmlns:r="http://schemas.openxmlformats.org/officeDocument/2006/relationships" r:dm="rId2" r:lo="rId3" r:qs="rId4" r:cs="rId5"/>
-          </a:graphicData>
-        </a:graphic>
-      </p:graphicFrame>
-      <p:sp>
-        <p:nvSpPr>
-          <p:cNvPr id="7" name="Textfeld 6"/>
-          <p:cNvSpPr txBox="1"/>
-          <p:nvPr/>
-        </p:nvSpPr>
-        <p:spPr>
-          <a:xfrm>
-            <a:off x="2555776" y="6597352"/>
-            <a:ext cx="2845011" cy="261610"/>
-          </a:xfrm>
-          <a:prstGeom prst="rect">
-            <a:avLst/>
-          </a:prstGeom>
-          <a:noFill/>
-        </p:spPr>
-        <p:txBody>
-          <a:bodyPr wrap="square" rtlCol="0">
-            <a:spAutoFit/>
-          </a:bodyPr>
-          <a:lstStyle/>
-          <a:p>
-            <a:pPr marL="0" lvl="1"/>
-            <a:r>
-              <a:rPr lang="de-DE" sz="1100" b="1" dirty="0" smtClean="0">
-                <a:solidFill>
-                  <a:schemeClr val="tx2"/>
-                </a:solidFill>
-              </a:rPr>
-              <a:t>a) </a:t>
-            </a:r>
-            <a:r>
-              <a:rPr lang="de-DE" sz="1100" b="1" dirty="0" smtClean="0"/>
-              <a:t>Projektteam und </a:t>
-            </a:r>
-            <a:r>
-              <a:rPr lang="de-DE" sz="1100" b="1" dirty="0" smtClean="0"/>
-              <a:t>Verantwortungen</a:t>
-            </a:r>
-            <a:endParaRPr lang="de-DE" b="1" dirty="0" smtClean="0"/>
-          </a:p>
-        </p:txBody>
-      </p:sp>
     </p:spTree>
   </p:cSld>
   <p:clrMapOvr>

</xml_diff>